<commit_message>
Added Projekt-Abschlussdokument Changed Presentation and fixed Resizing bug
</commit_message>
<xml_diff>
--- a/doc/Projektpraesentation_2017-01-23.pptx
+++ b/doc/Projektpraesentation_2017-01-23.pptx
@@ -1323,26 +1323,26 @@
     </dgm:pt>
   </dgm:ptLst>
   <dgm:cxnLst>
+    <dgm:cxn modelId="{930F80D7-B70F-4BE9-BA24-52D2B3DD8014}" type="presOf" srcId="{12B38994-7405-4024-876F-61E98715B52C}" destId="{CAC668F8-BDE7-4B23-83A3-A4A585FFEF74}" srcOrd="0" destOrd="0" presId="urn:microsoft.com/office/officeart/2008/layout/NameandTitleOrganizationalChart"/>
     <dgm:cxn modelId="{1EEB3992-FCD5-42C4-9484-C83CE350A0E6}" type="presOf" srcId="{EF6A1E31-EA37-48FB-A847-82C038B6BE12}" destId="{FDB1AC64-F678-469B-9507-3DEB0AFE1051}" srcOrd="0" destOrd="0" presId="urn:microsoft.com/office/officeart/2008/layout/NameandTitleOrganizationalChart"/>
-    <dgm:cxn modelId="{C1C8A121-5C51-4D89-8A06-C3B6381ACCA3}" type="presOf" srcId="{20059406-BD8B-4E55-A3D8-C969D088B016}" destId="{716ECB80-0194-4007-943B-3E4B2B747A67}" srcOrd="0" destOrd="0" presId="urn:microsoft.com/office/officeart/2008/layout/NameandTitleOrganizationalChart"/>
+    <dgm:cxn modelId="{DE128A50-E354-40E4-A45A-5DADABA48395}" srcId="{20059406-BD8B-4E55-A3D8-C969D088B016}" destId="{94048916-DF9A-4086-BB48-11FCC2B23560}" srcOrd="1" destOrd="0" parTransId="{D5164096-2E3E-4A76-AE62-F999EBA0BF5B}" sibTransId="{0E0DCCDB-5551-4409-93D2-F9FBEB33AEF4}"/>
+    <dgm:cxn modelId="{00014778-BF7B-45A9-B0E8-5C1E7B32F1F0}" type="presOf" srcId="{E0DD6EDE-0D0B-431C-9595-B77CA81EA886}" destId="{DF867B46-5BD7-42DF-ACC5-EB33254E9FA6}" srcOrd="0" destOrd="0" presId="urn:microsoft.com/office/officeart/2008/layout/NameandTitleOrganizationalChart"/>
+    <dgm:cxn modelId="{C7C20316-CB48-4C58-B5D7-0A5C1C1D44C8}" type="presOf" srcId="{0E0DCCDB-5551-4409-93D2-F9FBEB33AEF4}" destId="{085A1E17-6888-4ED1-A757-135ACFFC0060}" srcOrd="0" destOrd="0" presId="urn:microsoft.com/office/officeart/2008/layout/NameandTitleOrganizationalChart"/>
+    <dgm:cxn modelId="{F4B49695-D0FA-4C68-BDF8-0C8AE9E401EC}" type="presOf" srcId="{BF768398-1F50-47BA-B413-15CFCC39EF06}" destId="{0B8256DD-B2CD-44E8-9010-00F420B14DB5}" srcOrd="0" destOrd="0" presId="urn:microsoft.com/office/officeart/2008/layout/NameandTitleOrganizationalChart"/>
+    <dgm:cxn modelId="{26A9285D-CBC3-4156-B5F7-C06D59E0A096}" type="presOf" srcId="{BCC051DA-1989-4043-A71C-DB5B203007E2}" destId="{F45B4FC5-3190-478B-8897-3B75D7FA7A0D}" srcOrd="0" destOrd="0" presId="urn:microsoft.com/office/officeart/2008/layout/NameandTitleOrganizationalChart"/>
     <dgm:cxn modelId="{698E2737-EC9E-486D-80E7-869BEB9E0112}" type="presOf" srcId="{34452C4A-3AD4-40CC-ABE0-61FFF178E9D3}" destId="{918A7BD1-7E2B-44F0-A5C2-418A7388A0C3}" srcOrd="0" destOrd="0" presId="urn:microsoft.com/office/officeart/2008/layout/NameandTitleOrganizationalChart"/>
-    <dgm:cxn modelId="{85C6BF22-F502-49FF-A3DD-7F3D1D6D0F86}" type="presOf" srcId="{AFF29BE7-25FC-4575-B4DB-7C07A43F6273}" destId="{CA314C33-65D9-4369-848E-581F54529FDD}" srcOrd="0" destOrd="0" presId="urn:microsoft.com/office/officeart/2008/layout/NameandTitleOrganizationalChart"/>
-    <dgm:cxn modelId="{26BA074D-742A-43E6-838B-380CFFA0A147}" type="presOf" srcId="{BF768398-1F50-47BA-B413-15CFCC39EF06}" destId="{FAAD20CC-D509-4480-8699-E1231CB7F67A}" srcOrd="1" destOrd="0" presId="urn:microsoft.com/office/officeart/2008/layout/NameandTitleOrganizationalChart"/>
-    <dgm:cxn modelId="{930F80D7-B70F-4BE9-BA24-52D2B3DD8014}" type="presOf" srcId="{12B38994-7405-4024-876F-61E98715B52C}" destId="{CAC668F8-BDE7-4B23-83A3-A4A585FFEF74}" srcOrd="0" destOrd="0" presId="urn:microsoft.com/office/officeart/2008/layout/NameandTitleOrganizationalChart"/>
     <dgm:cxn modelId="{22E28A24-9034-404E-A0EF-4C6FEC2DDAA2}" srcId="{12B38994-7405-4024-876F-61E98715B52C}" destId="{20059406-BD8B-4E55-A3D8-C969D088B016}" srcOrd="0" destOrd="0" parTransId="{45E756B0-BCB0-47DF-AD93-228EE925A498}" sibTransId="{EF6A1E31-EA37-48FB-A847-82C038B6BE12}"/>
     <dgm:cxn modelId="{E237DC10-5918-4EA3-9B28-2D6C7832424E}" type="presOf" srcId="{94048916-DF9A-4086-BB48-11FCC2B23560}" destId="{B851F6B2-F1D1-4C70-A8D5-15EC9B51F8CA}" srcOrd="1" destOrd="0" presId="urn:microsoft.com/office/officeart/2008/layout/NameandTitleOrganizationalChart"/>
+    <dgm:cxn modelId="{E838D032-F6C7-4DF5-BD60-6E2BD44F4A35}" type="presOf" srcId="{865FC03B-0A3C-4339-8C40-902CCB541A0F}" destId="{066AD075-C727-49B0-8697-5F482CA314A5}" srcOrd="0" destOrd="0" presId="urn:microsoft.com/office/officeart/2008/layout/NameandTitleOrganizationalChart"/>
+    <dgm:cxn modelId="{18AC7E22-F5A8-4B45-AE2F-2FBBD79B00FB}" srcId="{20059406-BD8B-4E55-A3D8-C969D088B016}" destId="{BF768398-1F50-47BA-B413-15CFCC39EF06}" srcOrd="0" destOrd="0" parTransId="{865FC03B-0A3C-4339-8C40-902CCB541A0F}" sibTransId="{BCC051DA-1989-4043-A71C-DB5B203007E2}"/>
+    <dgm:cxn modelId="{85C6BF22-F502-49FF-A3DD-7F3D1D6D0F86}" type="presOf" srcId="{AFF29BE7-25FC-4575-B4DB-7C07A43F6273}" destId="{CA314C33-65D9-4369-848E-581F54529FDD}" srcOrd="0" destOrd="0" presId="urn:microsoft.com/office/officeart/2008/layout/NameandTitleOrganizationalChart"/>
     <dgm:cxn modelId="{D081E0F4-BB2C-4B23-B27E-1472DA49A0C0}" type="presOf" srcId="{20059406-BD8B-4E55-A3D8-C969D088B016}" destId="{A61F234B-0585-46A7-BCD8-745401D0B266}" srcOrd="1" destOrd="0" presId="urn:microsoft.com/office/officeart/2008/layout/NameandTitleOrganizationalChart"/>
+    <dgm:cxn modelId="{D12AE26E-5917-4563-9A79-9477727D98F3}" type="presOf" srcId="{94048916-DF9A-4086-BB48-11FCC2B23560}" destId="{7C8D0D91-FAC7-441F-9D8A-E9C5D755041B}" srcOrd="0" destOrd="0" presId="urn:microsoft.com/office/officeart/2008/layout/NameandTitleOrganizationalChart"/>
+    <dgm:cxn modelId="{0E681634-313B-42BA-A51A-63BD65AC9062}" srcId="{20059406-BD8B-4E55-A3D8-C969D088B016}" destId="{AFF29BE7-25FC-4575-B4DB-7C07A43F6273}" srcOrd="2" destOrd="0" parTransId="{E0DD6EDE-0D0B-431C-9595-B77CA81EA886}" sibTransId="{34452C4A-3AD4-40CC-ABE0-61FFF178E9D3}"/>
     <dgm:cxn modelId="{4EB0891D-D16A-4F0E-B3AD-9049FA307B9B}" type="presOf" srcId="{D5164096-2E3E-4A76-AE62-F999EBA0BF5B}" destId="{E7AC83D8-6B8B-4F09-9A35-7EA9A0698357}" srcOrd="0" destOrd="0" presId="urn:microsoft.com/office/officeart/2008/layout/NameandTitleOrganizationalChart"/>
-    <dgm:cxn modelId="{E838D032-F6C7-4DF5-BD60-6E2BD44F4A35}" type="presOf" srcId="{865FC03B-0A3C-4339-8C40-902CCB541A0F}" destId="{066AD075-C727-49B0-8697-5F482CA314A5}" srcOrd="0" destOrd="0" presId="urn:microsoft.com/office/officeart/2008/layout/NameandTitleOrganizationalChart"/>
     <dgm:cxn modelId="{CB2C945C-42E3-438C-8AF5-3AE2987C97BF}" type="presOf" srcId="{AFF29BE7-25FC-4575-B4DB-7C07A43F6273}" destId="{1D8749A8-F4BF-4C1B-B4DF-72EF68C4C064}" srcOrd="1" destOrd="0" presId="urn:microsoft.com/office/officeart/2008/layout/NameandTitleOrganizationalChart"/>
-    <dgm:cxn modelId="{18AC7E22-F5A8-4B45-AE2F-2FBBD79B00FB}" srcId="{20059406-BD8B-4E55-A3D8-C969D088B016}" destId="{BF768398-1F50-47BA-B413-15CFCC39EF06}" srcOrd="0" destOrd="0" parTransId="{865FC03B-0A3C-4339-8C40-902CCB541A0F}" sibTransId="{BCC051DA-1989-4043-A71C-DB5B203007E2}"/>
-    <dgm:cxn modelId="{26A9285D-CBC3-4156-B5F7-C06D59E0A096}" type="presOf" srcId="{BCC051DA-1989-4043-A71C-DB5B203007E2}" destId="{F45B4FC5-3190-478B-8897-3B75D7FA7A0D}" srcOrd="0" destOrd="0" presId="urn:microsoft.com/office/officeart/2008/layout/NameandTitleOrganizationalChart"/>
-    <dgm:cxn modelId="{00014778-BF7B-45A9-B0E8-5C1E7B32F1F0}" type="presOf" srcId="{E0DD6EDE-0D0B-431C-9595-B77CA81EA886}" destId="{DF867B46-5BD7-42DF-ACC5-EB33254E9FA6}" srcOrd="0" destOrd="0" presId="urn:microsoft.com/office/officeart/2008/layout/NameandTitleOrganizationalChart"/>
-    <dgm:cxn modelId="{DE128A50-E354-40E4-A45A-5DADABA48395}" srcId="{20059406-BD8B-4E55-A3D8-C969D088B016}" destId="{94048916-DF9A-4086-BB48-11FCC2B23560}" srcOrd="1" destOrd="0" parTransId="{D5164096-2E3E-4A76-AE62-F999EBA0BF5B}" sibTransId="{0E0DCCDB-5551-4409-93D2-F9FBEB33AEF4}"/>
-    <dgm:cxn modelId="{F4B49695-D0FA-4C68-BDF8-0C8AE9E401EC}" type="presOf" srcId="{BF768398-1F50-47BA-B413-15CFCC39EF06}" destId="{0B8256DD-B2CD-44E8-9010-00F420B14DB5}" srcOrd="0" destOrd="0" presId="urn:microsoft.com/office/officeart/2008/layout/NameandTitleOrganizationalChart"/>
-    <dgm:cxn modelId="{0E681634-313B-42BA-A51A-63BD65AC9062}" srcId="{20059406-BD8B-4E55-A3D8-C969D088B016}" destId="{AFF29BE7-25FC-4575-B4DB-7C07A43F6273}" srcOrd="2" destOrd="0" parTransId="{E0DD6EDE-0D0B-431C-9595-B77CA81EA886}" sibTransId="{34452C4A-3AD4-40CC-ABE0-61FFF178E9D3}"/>
-    <dgm:cxn modelId="{C7C20316-CB48-4C58-B5D7-0A5C1C1D44C8}" type="presOf" srcId="{0E0DCCDB-5551-4409-93D2-F9FBEB33AEF4}" destId="{085A1E17-6888-4ED1-A757-135ACFFC0060}" srcOrd="0" destOrd="0" presId="urn:microsoft.com/office/officeart/2008/layout/NameandTitleOrganizationalChart"/>
-    <dgm:cxn modelId="{D12AE26E-5917-4563-9A79-9477727D98F3}" type="presOf" srcId="{94048916-DF9A-4086-BB48-11FCC2B23560}" destId="{7C8D0D91-FAC7-441F-9D8A-E9C5D755041B}" srcOrd="0" destOrd="0" presId="urn:microsoft.com/office/officeart/2008/layout/NameandTitleOrganizationalChart"/>
+    <dgm:cxn modelId="{C1C8A121-5C51-4D89-8A06-C3B6381ACCA3}" type="presOf" srcId="{20059406-BD8B-4E55-A3D8-C969D088B016}" destId="{716ECB80-0194-4007-943B-3E4B2B747A67}" srcOrd="0" destOrd="0" presId="urn:microsoft.com/office/officeart/2008/layout/NameandTitleOrganizationalChart"/>
+    <dgm:cxn modelId="{26BA074D-742A-43E6-838B-380CFFA0A147}" type="presOf" srcId="{BF768398-1F50-47BA-B413-15CFCC39EF06}" destId="{FAAD20CC-D509-4480-8699-E1231CB7F67A}" srcOrd="1" destOrd="0" presId="urn:microsoft.com/office/officeart/2008/layout/NameandTitleOrganizationalChart"/>
     <dgm:cxn modelId="{78249B42-EE0E-4B8E-A98D-92D7AFBAA4DE}" type="presParOf" srcId="{CAC668F8-BDE7-4B23-83A3-A4A585FFEF74}" destId="{6FDF0570-80CC-455C-A13F-F88D0E951F1C}" srcOrd="0" destOrd="0" presId="urn:microsoft.com/office/officeart/2008/layout/NameandTitleOrganizationalChart"/>
     <dgm:cxn modelId="{8F3131FE-4F40-4A57-995E-715374EDC076}" type="presParOf" srcId="{6FDF0570-80CC-455C-A13F-F88D0E951F1C}" destId="{C69346A7-0024-4A26-A589-62D42A692425}" srcOrd="0" destOrd="0" presId="urn:microsoft.com/office/officeart/2008/layout/NameandTitleOrganizationalChart"/>
     <dgm:cxn modelId="{E54824F4-2AEE-4CA8-B6BA-9B098EE706DF}" type="presParOf" srcId="{C69346A7-0024-4A26-A589-62D42A692425}" destId="{716ECB80-0194-4007-943B-3E4B2B747A67}" srcOrd="0" destOrd="0" presId="urn:microsoft.com/office/officeart/2008/layout/NameandTitleOrganizationalChart"/>
@@ -4529,7 +4529,7 @@
           <a:p>
             <a:fld id="{748F024B-076F-4586-BF0D-4DDEFB4C70E4}" type="datetimeFigureOut">
               <a:rPr lang="de-AT" smtClean="0"/>
-              <a:t>15.01.2017</a:t>
+              <a:t>17.01.2017</a:t>
             </a:fld>
             <a:endParaRPr lang="de-AT"/>
           </a:p>
@@ -4906,6 +4906,17 @@
               <a:t> </a:t>
             </a:r>
           </a:p>
+          <a:p>
+            <a:r>
+              <a:rPr lang="de-AT" dirty="0"/>
+              <a:t>Macht </a:t>
+            </a:r>
+            <a:r>
+              <a:rPr lang="de-AT" dirty="0" err="1"/>
+              <a:t>selina</a:t>
+            </a:r>
+            <a:endParaRPr lang="de-AT" dirty="0"/>
+          </a:p>
         </p:txBody>
       </p:sp>
       <p:sp>
@@ -5065,6 +5076,17 @@
               <a:t>:</a:t>
             </a:r>
           </a:p>
+          <a:p>
+            <a:r>
+              <a:rPr lang="de-AT" dirty="0"/>
+              <a:t>Mach </a:t>
+            </a:r>
+            <a:r>
+              <a:rPr lang="de-AT" dirty="0" err="1"/>
+              <a:t>selina</a:t>
+            </a:r>
+            <a:endParaRPr lang="de-AT" dirty="0"/>
+          </a:p>
         </p:txBody>
       </p:sp>
       <p:sp>
@@ -5094,6 +5116,272 @@
     <p:extLst>
       <p:ext uri="{BB962C8B-B14F-4D97-AF65-F5344CB8AC3E}">
         <p14:creationId xmlns:p14="http://schemas.microsoft.com/office/powerpoint/2010/main" val="2448120461"/>
+      </p:ext>
+    </p:extLst>
+  </p:cSld>
+  <p:clrMapOvr>
+    <a:masterClrMapping/>
+  </p:clrMapOvr>
+</p:notes>
+</file>
+
+<file path=ppt/notesSlides/notesSlide3.xml><?xml version="1.0" encoding="utf-8"?>
+<p:notes xmlns:a="http://schemas.openxmlformats.org/drawingml/2006/main" xmlns:r="http://schemas.openxmlformats.org/officeDocument/2006/relationships" xmlns:p="http://schemas.openxmlformats.org/presentationml/2006/main">
+  <p:cSld>
+    <p:spTree>
+      <p:nvGrpSpPr>
+        <p:cNvPr id="1" name=""/>
+        <p:cNvGrpSpPr/>
+        <p:nvPr/>
+      </p:nvGrpSpPr>
+      <p:grpSpPr>
+        <a:xfrm>
+          <a:off x="0" y="0"/>
+          <a:ext cx="0" cy="0"/>
+          <a:chOff x="0" y="0"/>
+          <a:chExt cx="0" cy="0"/>
+        </a:xfrm>
+      </p:grpSpPr>
+      <p:sp>
+        <p:nvSpPr>
+          <p:cNvPr id="2" name="Folienbildplatzhalter 1"/>
+          <p:cNvSpPr>
+            <a:spLocks noGrp="1" noRot="1" noChangeAspect="1"/>
+          </p:cNvSpPr>
+          <p:nvPr>
+            <p:ph type="sldImg"/>
+          </p:nvPr>
+        </p:nvSpPr>
+        <p:spPr/>
+      </p:sp>
+      <p:sp>
+        <p:nvSpPr>
+          <p:cNvPr id="3" name="Notizenplatzhalter 2"/>
+          <p:cNvSpPr>
+            <a:spLocks noGrp="1"/>
+          </p:cNvSpPr>
+          <p:nvPr>
+            <p:ph type="body" idx="1"/>
+          </p:nvPr>
+        </p:nvSpPr>
+        <p:spPr/>
+        <p:txBody>
+          <a:bodyPr/>
+          <a:lstStyle/>
+          <a:p>
+            <a:r>
+              <a:rPr lang="de-AT" dirty="0"/>
+              <a:t>Mach ich</a:t>
+            </a:r>
+          </a:p>
+        </p:txBody>
+      </p:sp>
+      <p:sp>
+        <p:nvSpPr>
+          <p:cNvPr id="4" name="Foliennummernplatzhalter 3"/>
+          <p:cNvSpPr>
+            <a:spLocks noGrp="1"/>
+          </p:cNvSpPr>
+          <p:nvPr>
+            <p:ph type="sldNum" sz="quarter" idx="10"/>
+          </p:nvPr>
+        </p:nvSpPr>
+        <p:spPr/>
+        <p:txBody>
+          <a:bodyPr/>
+          <a:lstStyle/>
+          <a:p>
+            <a:fld id="{FFB944FA-82A2-4D87-AF4C-32D6F3284FD2}" type="slidenum">
+              <a:rPr lang="de-AT" smtClean="0"/>
+              <a:t>4</a:t>
+            </a:fld>
+            <a:endParaRPr lang="de-AT"/>
+          </a:p>
+        </p:txBody>
+      </p:sp>
+    </p:spTree>
+    <p:extLst>
+      <p:ext uri="{BB962C8B-B14F-4D97-AF65-F5344CB8AC3E}">
+        <p14:creationId xmlns:p14="http://schemas.microsoft.com/office/powerpoint/2010/main" val="2412936530"/>
+      </p:ext>
+    </p:extLst>
+  </p:cSld>
+  <p:clrMapOvr>
+    <a:masterClrMapping/>
+  </p:clrMapOvr>
+</p:notes>
+</file>
+
+<file path=ppt/notesSlides/notesSlide4.xml><?xml version="1.0" encoding="utf-8"?>
+<p:notes xmlns:a="http://schemas.openxmlformats.org/drawingml/2006/main" xmlns:r="http://schemas.openxmlformats.org/officeDocument/2006/relationships" xmlns:p="http://schemas.openxmlformats.org/presentationml/2006/main">
+  <p:cSld>
+    <p:spTree>
+      <p:nvGrpSpPr>
+        <p:cNvPr id="1" name=""/>
+        <p:cNvGrpSpPr/>
+        <p:nvPr/>
+      </p:nvGrpSpPr>
+      <p:grpSpPr>
+        <a:xfrm>
+          <a:off x="0" y="0"/>
+          <a:ext cx="0" cy="0"/>
+          <a:chOff x="0" y="0"/>
+          <a:chExt cx="0" cy="0"/>
+        </a:xfrm>
+      </p:grpSpPr>
+      <p:sp>
+        <p:nvSpPr>
+          <p:cNvPr id="2" name="Folienbildplatzhalter 1"/>
+          <p:cNvSpPr>
+            <a:spLocks noGrp="1" noRot="1" noChangeAspect="1"/>
+          </p:cNvSpPr>
+          <p:nvPr>
+            <p:ph type="sldImg"/>
+          </p:nvPr>
+        </p:nvSpPr>
+        <p:spPr/>
+      </p:sp>
+      <p:sp>
+        <p:nvSpPr>
+          <p:cNvPr id="3" name="Notizenplatzhalter 2"/>
+          <p:cNvSpPr>
+            <a:spLocks noGrp="1"/>
+          </p:cNvSpPr>
+          <p:nvPr>
+            <p:ph type="body" idx="1"/>
+          </p:nvPr>
+        </p:nvSpPr>
+        <p:spPr/>
+        <p:txBody>
+          <a:bodyPr/>
+          <a:lstStyle/>
+          <a:p>
+            <a:r>
+              <a:rPr lang="de-AT" dirty="0"/>
+              <a:t>Macht der Alex</a:t>
+            </a:r>
+          </a:p>
+        </p:txBody>
+      </p:sp>
+      <p:sp>
+        <p:nvSpPr>
+          <p:cNvPr id="4" name="Foliennummernplatzhalter 3"/>
+          <p:cNvSpPr>
+            <a:spLocks noGrp="1"/>
+          </p:cNvSpPr>
+          <p:nvPr>
+            <p:ph type="sldNum" sz="quarter" idx="10"/>
+          </p:nvPr>
+        </p:nvSpPr>
+        <p:spPr/>
+        <p:txBody>
+          <a:bodyPr/>
+          <a:lstStyle/>
+          <a:p>
+            <a:fld id="{FFB944FA-82A2-4D87-AF4C-32D6F3284FD2}" type="slidenum">
+              <a:rPr lang="de-AT" smtClean="0"/>
+              <a:t>5</a:t>
+            </a:fld>
+            <a:endParaRPr lang="de-AT"/>
+          </a:p>
+        </p:txBody>
+      </p:sp>
+    </p:spTree>
+    <p:extLst>
+      <p:ext uri="{BB962C8B-B14F-4D97-AF65-F5344CB8AC3E}">
+        <p14:creationId xmlns:p14="http://schemas.microsoft.com/office/powerpoint/2010/main" val="3110576319"/>
+      </p:ext>
+    </p:extLst>
+  </p:cSld>
+  <p:clrMapOvr>
+    <a:masterClrMapping/>
+  </p:clrMapOvr>
+</p:notes>
+</file>
+
+<file path=ppt/notesSlides/notesSlide5.xml><?xml version="1.0" encoding="utf-8"?>
+<p:notes xmlns:a="http://schemas.openxmlformats.org/drawingml/2006/main" xmlns:r="http://schemas.openxmlformats.org/officeDocument/2006/relationships" xmlns:p="http://schemas.openxmlformats.org/presentationml/2006/main">
+  <p:cSld>
+    <p:spTree>
+      <p:nvGrpSpPr>
+        <p:cNvPr id="1" name=""/>
+        <p:cNvGrpSpPr/>
+        <p:nvPr/>
+      </p:nvGrpSpPr>
+      <p:grpSpPr>
+        <a:xfrm>
+          <a:off x="0" y="0"/>
+          <a:ext cx="0" cy="0"/>
+          <a:chOff x="0" y="0"/>
+          <a:chExt cx="0" cy="0"/>
+        </a:xfrm>
+      </p:grpSpPr>
+      <p:sp>
+        <p:nvSpPr>
+          <p:cNvPr id="2" name="Folienbildplatzhalter 1"/>
+          <p:cNvSpPr>
+            <a:spLocks noGrp="1" noRot="1" noChangeAspect="1"/>
+          </p:cNvSpPr>
+          <p:nvPr>
+            <p:ph type="sldImg"/>
+          </p:nvPr>
+        </p:nvSpPr>
+        <p:spPr/>
+      </p:sp>
+      <p:sp>
+        <p:nvSpPr>
+          <p:cNvPr id="3" name="Notizenplatzhalter 2"/>
+          <p:cNvSpPr>
+            <a:spLocks noGrp="1"/>
+          </p:cNvSpPr>
+          <p:nvPr>
+            <p:ph type="body" idx="1"/>
+          </p:nvPr>
+        </p:nvSpPr>
+        <p:spPr/>
+        <p:txBody>
+          <a:bodyPr/>
+          <a:lstStyle/>
+          <a:p>
+            <a:r>
+              <a:rPr lang="de-AT" dirty="0"/>
+              <a:t>Macht </a:t>
+            </a:r>
+            <a:r>
+              <a:rPr lang="de-AT" dirty="0" err="1"/>
+              <a:t>phillp</a:t>
+            </a:r>
+            <a:endParaRPr lang="de-AT" dirty="0"/>
+          </a:p>
+        </p:txBody>
+      </p:sp>
+      <p:sp>
+        <p:nvSpPr>
+          <p:cNvPr id="4" name="Foliennummernplatzhalter 3"/>
+          <p:cNvSpPr>
+            <a:spLocks noGrp="1"/>
+          </p:cNvSpPr>
+          <p:nvPr>
+            <p:ph type="sldNum" sz="quarter" idx="10"/>
+          </p:nvPr>
+        </p:nvSpPr>
+        <p:spPr/>
+        <p:txBody>
+          <a:bodyPr/>
+          <a:lstStyle/>
+          <a:p>
+            <a:fld id="{FFB944FA-82A2-4D87-AF4C-32D6F3284FD2}" type="slidenum">
+              <a:rPr lang="de-AT" smtClean="0"/>
+              <a:t>6</a:t>
+            </a:fld>
+            <a:endParaRPr lang="de-AT"/>
+          </a:p>
+        </p:txBody>
+      </p:sp>
+    </p:spTree>
+    <p:extLst>
+      <p:ext uri="{BB962C8B-B14F-4D97-AF65-F5344CB8AC3E}">
+        <p14:creationId xmlns:p14="http://schemas.microsoft.com/office/powerpoint/2010/main" val="4256631752"/>
       </p:ext>
     </p:extLst>
   </p:cSld>
@@ -5234,7 +5522,7 @@
           <a:p>
             <a:fld id="{81E4DA5A-B91E-4736-AA36-536C06A9A47C}" type="datetimeFigureOut">
               <a:rPr lang="de-AT" smtClean="0"/>
-              <a:t>15.01.2017</a:t>
+              <a:t>17.01.2017</a:t>
             </a:fld>
             <a:endParaRPr lang="de-AT"/>
           </a:p>
@@ -5404,7 +5692,7 @@
           <a:p>
             <a:fld id="{81E4DA5A-B91E-4736-AA36-536C06A9A47C}" type="datetimeFigureOut">
               <a:rPr lang="de-AT" smtClean="0"/>
-              <a:t>15.01.2017</a:t>
+              <a:t>17.01.2017</a:t>
             </a:fld>
             <a:endParaRPr lang="de-AT"/>
           </a:p>
@@ -5584,7 +5872,7 @@
           <a:p>
             <a:fld id="{81E4DA5A-B91E-4736-AA36-536C06A9A47C}" type="datetimeFigureOut">
               <a:rPr lang="de-AT" smtClean="0"/>
-              <a:t>15.01.2017</a:t>
+              <a:t>17.01.2017</a:t>
             </a:fld>
             <a:endParaRPr lang="de-AT"/>
           </a:p>
@@ -5754,7 +6042,7 @@
           <a:p>
             <a:fld id="{81E4DA5A-B91E-4736-AA36-536C06A9A47C}" type="datetimeFigureOut">
               <a:rPr lang="de-AT" smtClean="0"/>
-              <a:t>15.01.2017</a:t>
+              <a:t>17.01.2017</a:t>
             </a:fld>
             <a:endParaRPr lang="de-AT"/>
           </a:p>
@@ -5998,7 +6286,7 @@
           <a:p>
             <a:fld id="{81E4DA5A-B91E-4736-AA36-536C06A9A47C}" type="datetimeFigureOut">
               <a:rPr lang="de-AT" smtClean="0"/>
-              <a:t>15.01.2017</a:t>
+              <a:t>17.01.2017</a:t>
             </a:fld>
             <a:endParaRPr lang="de-AT"/>
           </a:p>
@@ -6230,7 +6518,7 @@
           <a:p>
             <a:fld id="{81E4DA5A-B91E-4736-AA36-536C06A9A47C}" type="datetimeFigureOut">
               <a:rPr lang="de-AT" smtClean="0"/>
-              <a:t>15.01.2017</a:t>
+              <a:t>17.01.2017</a:t>
             </a:fld>
             <a:endParaRPr lang="de-AT"/>
           </a:p>
@@ -6597,7 +6885,7 @@
           <a:p>
             <a:fld id="{81E4DA5A-B91E-4736-AA36-536C06A9A47C}" type="datetimeFigureOut">
               <a:rPr lang="de-AT" smtClean="0"/>
-              <a:t>15.01.2017</a:t>
+              <a:t>17.01.2017</a:t>
             </a:fld>
             <a:endParaRPr lang="de-AT"/>
           </a:p>
@@ -6715,7 +7003,7 @@
           <a:p>
             <a:fld id="{81E4DA5A-B91E-4736-AA36-536C06A9A47C}" type="datetimeFigureOut">
               <a:rPr lang="de-AT" smtClean="0"/>
-              <a:t>15.01.2017</a:t>
+              <a:t>17.01.2017</a:t>
             </a:fld>
             <a:endParaRPr lang="de-AT"/>
           </a:p>
@@ -6810,7 +7098,7 @@
           <a:p>
             <a:fld id="{81E4DA5A-B91E-4736-AA36-536C06A9A47C}" type="datetimeFigureOut">
               <a:rPr lang="de-AT" smtClean="0"/>
-              <a:t>15.01.2017</a:t>
+              <a:t>17.01.2017</a:t>
             </a:fld>
             <a:endParaRPr lang="de-AT"/>
           </a:p>
@@ -7087,7 +7375,7 @@
           <a:p>
             <a:fld id="{81E4DA5A-B91E-4736-AA36-536C06A9A47C}" type="datetimeFigureOut">
               <a:rPr lang="de-AT" smtClean="0"/>
-              <a:t>15.01.2017</a:t>
+              <a:t>17.01.2017</a:t>
             </a:fld>
             <a:endParaRPr lang="de-AT"/>
           </a:p>
@@ -7344,7 +7632,7 @@
           <a:p>
             <a:fld id="{81E4DA5A-B91E-4736-AA36-536C06A9A47C}" type="datetimeFigureOut">
               <a:rPr lang="de-AT" smtClean="0"/>
-              <a:t>15.01.2017</a:t>
+              <a:t>17.01.2017</a:t>
             </a:fld>
             <a:endParaRPr lang="de-AT"/>
           </a:p>
@@ -7557,7 +7845,7 @@
           <a:p>
             <a:fld id="{81E4DA5A-B91E-4736-AA36-536C06A9A47C}" type="datetimeFigureOut">
               <a:rPr lang="de-AT" smtClean="0"/>
-              <a:t>15.01.2017</a:t>
+              <a:t>17.01.2017</a:t>
             </a:fld>
             <a:endParaRPr lang="de-AT"/>
           </a:p>
@@ -8100,13 +8388,8 @@
             </a:pPr>
             <a:r>
               <a:rPr lang="de-AT" sz="3600" b="1" dirty="0"/>
-              <a:t>The MMOTTG </a:t>
-            </a:r>
-            <a:r>
-              <a:rPr lang="de-AT" sz="3600" b="1" dirty="0" err="1"/>
-              <a:t>site</a:t>
-            </a:r>
-            <a:endParaRPr lang="de-AT" sz="3600" b="1" dirty="0"/>
+              <a:t>The MMOTTG Site</a:t>
+            </a:r>
           </a:p>
           <a:p>
             <a:pPr algn="ctr">
@@ -9342,7 +9625,7 @@
           <p:nvPr/>
         </p:nvPicPr>
         <p:blipFill>
-          <a:blip r:embed="rId2">
+          <a:blip r:embed="rId3">
             <a:extLst>
               <a:ext uri="{28A0092B-C50C-407E-A947-70E740481C1C}">
                 <a14:useLocalDpi xmlns:a14="http://schemas.microsoft.com/office/drawing/2010/main"/>
@@ -9627,7 +9910,7 @@
           <p:nvPr/>
         </p:nvPicPr>
         <p:blipFill>
-          <a:blip r:embed="rId2">
+          <a:blip r:embed="rId3">
             <a:extLst>
               <a:ext uri="{28A0092B-C50C-407E-A947-70E740481C1C}">
                 <a14:useLocalDpi xmlns:a14="http://schemas.microsoft.com/office/drawing/2010/main"/>
@@ -9657,7 +9940,7 @@
         <p:spPr>
           <a:xfrm>
             <a:off x="644769" y="1289538"/>
-            <a:ext cx="3404073" cy="369332"/>
+            <a:ext cx="3404073" cy="923330"/>
           </a:xfrm>
           <a:prstGeom prst="rect">
             <a:avLst/>
@@ -9674,6 +9957,23 @@
               <a:rPr lang="de-AT" dirty="0"/>
               <a:t>Reden über was wir gelernt haben</a:t>
             </a:r>
+          </a:p>
+          <a:p>
+            <a:r>
+              <a:rPr lang="de-AT" dirty="0"/>
+              <a:t>+ </a:t>
+            </a:r>
+            <a:r>
+              <a:rPr lang="de-AT" dirty="0" err="1"/>
+              <a:t>bilder</a:t>
+            </a:r>
+            <a:r>
+              <a:rPr lang="de-AT" dirty="0"/>
+              <a:t> von den Technologien</a:t>
+            </a:r>
+          </a:p>
+          <a:p>
+            <a:endParaRPr lang="de-AT" dirty="0"/>
           </a:p>
         </p:txBody>
       </p:sp>
@@ -9930,7 +10230,7 @@
       <p:pic>
         <p:nvPicPr>
           <p:cNvPr id="12" name="Grafik 11">
-            <a:hlinkClick r:id="rId2"/>
+            <a:hlinkClick r:id="rId3"/>
           </p:cNvPr>
           <p:cNvPicPr>
             <a:picLocks noChangeAspect="1"/>
@@ -9938,7 +10238,7 @@
           <p:nvPr/>
         </p:nvPicPr>
         <p:blipFill>
-          <a:blip r:embed="rId3">
+          <a:blip r:embed="rId4">
             <a:extLst>
               <a:ext uri="{28A0092B-C50C-407E-A947-70E740481C1C}">
                 <a14:useLocalDpi xmlns:a14="http://schemas.microsoft.com/office/drawing/2010/main"/>

</xml_diff>

<commit_message>
Updated Projektpräsentation Updated Abschlussdokument
</commit_message>
<xml_diff>
--- a/doc/Projektpraesentation_2017-01-23.pptx
+++ b/doc/Projektpraesentation_2017-01-23.pptx
@@ -5,15 +5,16 @@
     <p:sldMasterId id="2147483768" r:id="rId1"/>
   </p:sldMasterIdLst>
   <p:notesMasterIdLst>
-    <p:notesMasterId r:id="rId8"/>
+    <p:notesMasterId r:id="rId9"/>
   </p:notesMasterIdLst>
   <p:sldIdLst>
     <p:sldId id="256" r:id="rId2"/>
     <p:sldId id="257" r:id="rId3"/>
     <p:sldId id="258" r:id="rId4"/>
     <p:sldId id="259" r:id="rId5"/>
-    <p:sldId id="260" r:id="rId6"/>
-    <p:sldId id="261" r:id="rId7"/>
+    <p:sldId id="262" r:id="rId6"/>
+    <p:sldId id="260" r:id="rId7"/>
+    <p:sldId id="261" r:id="rId8"/>
   </p:sldIdLst>
   <p:sldSz cx="9144000" cy="6858000" type="screen4x3"/>
   <p:notesSz cx="6858000" cy="9144000"/>
@@ -908,7 +909,7 @@
         <a:lstStyle/>
         <a:p>
           <a:r>
-            <a:rPr lang="de-AT" sz="2000"/>
+            <a:rPr lang="de-AT" sz="2000" dirty="0"/>
             <a:t>Thiago Gumhold</a:t>
           </a:r>
         </a:p>
@@ -1323,26 +1324,26 @@
     </dgm:pt>
   </dgm:ptLst>
   <dgm:cxnLst>
+    <dgm:cxn modelId="{930F80D7-B70F-4BE9-BA24-52D2B3DD8014}" type="presOf" srcId="{12B38994-7405-4024-876F-61E98715B52C}" destId="{CAC668F8-BDE7-4B23-83A3-A4A585FFEF74}" srcOrd="0" destOrd="0" presId="urn:microsoft.com/office/officeart/2008/layout/NameandTitleOrganizationalChart"/>
     <dgm:cxn modelId="{1EEB3992-FCD5-42C4-9484-C83CE350A0E6}" type="presOf" srcId="{EF6A1E31-EA37-48FB-A847-82C038B6BE12}" destId="{FDB1AC64-F678-469B-9507-3DEB0AFE1051}" srcOrd="0" destOrd="0" presId="urn:microsoft.com/office/officeart/2008/layout/NameandTitleOrganizationalChart"/>
-    <dgm:cxn modelId="{C1C8A121-5C51-4D89-8A06-C3B6381ACCA3}" type="presOf" srcId="{20059406-BD8B-4E55-A3D8-C969D088B016}" destId="{716ECB80-0194-4007-943B-3E4B2B747A67}" srcOrd="0" destOrd="0" presId="urn:microsoft.com/office/officeart/2008/layout/NameandTitleOrganizationalChart"/>
+    <dgm:cxn modelId="{DE128A50-E354-40E4-A45A-5DADABA48395}" srcId="{20059406-BD8B-4E55-A3D8-C969D088B016}" destId="{94048916-DF9A-4086-BB48-11FCC2B23560}" srcOrd="1" destOrd="0" parTransId="{D5164096-2E3E-4A76-AE62-F999EBA0BF5B}" sibTransId="{0E0DCCDB-5551-4409-93D2-F9FBEB33AEF4}"/>
+    <dgm:cxn modelId="{00014778-BF7B-45A9-B0E8-5C1E7B32F1F0}" type="presOf" srcId="{E0DD6EDE-0D0B-431C-9595-B77CA81EA886}" destId="{DF867B46-5BD7-42DF-ACC5-EB33254E9FA6}" srcOrd="0" destOrd="0" presId="urn:microsoft.com/office/officeart/2008/layout/NameandTitleOrganizationalChart"/>
+    <dgm:cxn modelId="{C7C20316-CB48-4C58-B5D7-0A5C1C1D44C8}" type="presOf" srcId="{0E0DCCDB-5551-4409-93D2-F9FBEB33AEF4}" destId="{085A1E17-6888-4ED1-A757-135ACFFC0060}" srcOrd="0" destOrd="0" presId="urn:microsoft.com/office/officeart/2008/layout/NameandTitleOrganizationalChart"/>
+    <dgm:cxn modelId="{F4B49695-D0FA-4C68-BDF8-0C8AE9E401EC}" type="presOf" srcId="{BF768398-1F50-47BA-B413-15CFCC39EF06}" destId="{0B8256DD-B2CD-44E8-9010-00F420B14DB5}" srcOrd="0" destOrd="0" presId="urn:microsoft.com/office/officeart/2008/layout/NameandTitleOrganizationalChart"/>
+    <dgm:cxn modelId="{26A9285D-CBC3-4156-B5F7-C06D59E0A096}" type="presOf" srcId="{BCC051DA-1989-4043-A71C-DB5B203007E2}" destId="{F45B4FC5-3190-478B-8897-3B75D7FA7A0D}" srcOrd="0" destOrd="0" presId="urn:microsoft.com/office/officeart/2008/layout/NameandTitleOrganizationalChart"/>
     <dgm:cxn modelId="{698E2737-EC9E-486D-80E7-869BEB9E0112}" type="presOf" srcId="{34452C4A-3AD4-40CC-ABE0-61FFF178E9D3}" destId="{918A7BD1-7E2B-44F0-A5C2-418A7388A0C3}" srcOrd="0" destOrd="0" presId="urn:microsoft.com/office/officeart/2008/layout/NameandTitleOrganizationalChart"/>
-    <dgm:cxn modelId="{85C6BF22-F502-49FF-A3DD-7F3D1D6D0F86}" type="presOf" srcId="{AFF29BE7-25FC-4575-B4DB-7C07A43F6273}" destId="{CA314C33-65D9-4369-848E-581F54529FDD}" srcOrd="0" destOrd="0" presId="urn:microsoft.com/office/officeart/2008/layout/NameandTitleOrganizationalChart"/>
-    <dgm:cxn modelId="{26BA074D-742A-43E6-838B-380CFFA0A147}" type="presOf" srcId="{BF768398-1F50-47BA-B413-15CFCC39EF06}" destId="{FAAD20CC-D509-4480-8699-E1231CB7F67A}" srcOrd="1" destOrd="0" presId="urn:microsoft.com/office/officeart/2008/layout/NameandTitleOrganizationalChart"/>
-    <dgm:cxn modelId="{930F80D7-B70F-4BE9-BA24-52D2B3DD8014}" type="presOf" srcId="{12B38994-7405-4024-876F-61E98715B52C}" destId="{CAC668F8-BDE7-4B23-83A3-A4A585FFEF74}" srcOrd="0" destOrd="0" presId="urn:microsoft.com/office/officeart/2008/layout/NameandTitleOrganizationalChart"/>
     <dgm:cxn modelId="{22E28A24-9034-404E-A0EF-4C6FEC2DDAA2}" srcId="{12B38994-7405-4024-876F-61E98715B52C}" destId="{20059406-BD8B-4E55-A3D8-C969D088B016}" srcOrd="0" destOrd="0" parTransId="{45E756B0-BCB0-47DF-AD93-228EE925A498}" sibTransId="{EF6A1E31-EA37-48FB-A847-82C038B6BE12}"/>
     <dgm:cxn modelId="{E237DC10-5918-4EA3-9B28-2D6C7832424E}" type="presOf" srcId="{94048916-DF9A-4086-BB48-11FCC2B23560}" destId="{B851F6B2-F1D1-4C70-A8D5-15EC9B51F8CA}" srcOrd="1" destOrd="0" presId="urn:microsoft.com/office/officeart/2008/layout/NameandTitleOrganizationalChart"/>
+    <dgm:cxn modelId="{E838D032-F6C7-4DF5-BD60-6E2BD44F4A35}" type="presOf" srcId="{865FC03B-0A3C-4339-8C40-902CCB541A0F}" destId="{066AD075-C727-49B0-8697-5F482CA314A5}" srcOrd="0" destOrd="0" presId="urn:microsoft.com/office/officeart/2008/layout/NameandTitleOrganizationalChart"/>
+    <dgm:cxn modelId="{18AC7E22-F5A8-4B45-AE2F-2FBBD79B00FB}" srcId="{20059406-BD8B-4E55-A3D8-C969D088B016}" destId="{BF768398-1F50-47BA-B413-15CFCC39EF06}" srcOrd="0" destOrd="0" parTransId="{865FC03B-0A3C-4339-8C40-902CCB541A0F}" sibTransId="{BCC051DA-1989-4043-A71C-DB5B203007E2}"/>
+    <dgm:cxn modelId="{85C6BF22-F502-49FF-A3DD-7F3D1D6D0F86}" type="presOf" srcId="{AFF29BE7-25FC-4575-B4DB-7C07A43F6273}" destId="{CA314C33-65D9-4369-848E-581F54529FDD}" srcOrd="0" destOrd="0" presId="urn:microsoft.com/office/officeart/2008/layout/NameandTitleOrganizationalChart"/>
     <dgm:cxn modelId="{D081E0F4-BB2C-4B23-B27E-1472DA49A0C0}" type="presOf" srcId="{20059406-BD8B-4E55-A3D8-C969D088B016}" destId="{A61F234B-0585-46A7-BCD8-745401D0B266}" srcOrd="1" destOrd="0" presId="urn:microsoft.com/office/officeart/2008/layout/NameandTitleOrganizationalChart"/>
+    <dgm:cxn modelId="{D12AE26E-5917-4563-9A79-9477727D98F3}" type="presOf" srcId="{94048916-DF9A-4086-BB48-11FCC2B23560}" destId="{7C8D0D91-FAC7-441F-9D8A-E9C5D755041B}" srcOrd="0" destOrd="0" presId="urn:microsoft.com/office/officeart/2008/layout/NameandTitleOrganizationalChart"/>
+    <dgm:cxn modelId="{0E681634-313B-42BA-A51A-63BD65AC9062}" srcId="{20059406-BD8B-4E55-A3D8-C969D088B016}" destId="{AFF29BE7-25FC-4575-B4DB-7C07A43F6273}" srcOrd="2" destOrd="0" parTransId="{E0DD6EDE-0D0B-431C-9595-B77CA81EA886}" sibTransId="{34452C4A-3AD4-40CC-ABE0-61FFF178E9D3}"/>
     <dgm:cxn modelId="{4EB0891D-D16A-4F0E-B3AD-9049FA307B9B}" type="presOf" srcId="{D5164096-2E3E-4A76-AE62-F999EBA0BF5B}" destId="{E7AC83D8-6B8B-4F09-9A35-7EA9A0698357}" srcOrd="0" destOrd="0" presId="urn:microsoft.com/office/officeart/2008/layout/NameandTitleOrganizationalChart"/>
-    <dgm:cxn modelId="{E838D032-F6C7-4DF5-BD60-6E2BD44F4A35}" type="presOf" srcId="{865FC03B-0A3C-4339-8C40-902CCB541A0F}" destId="{066AD075-C727-49B0-8697-5F482CA314A5}" srcOrd="0" destOrd="0" presId="urn:microsoft.com/office/officeart/2008/layout/NameandTitleOrganizationalChart"/>
     <dgm:cxn modelId="{CB2C945C-42E3-438C-8AF5-3AE2987C97BF}" type="presOf" srcId="{AFF29BE7-25FC-4575-B4DB-7C07A43F6273}" destId="{1D8749A8-F4BF-4C1B-B4DF-72EF68C4C064}" srcOrd="1" destOrd="0" presId="urn:microsoft.com/office/officeart/2008/layout/NameandTitleOrganizationalChart"/>
-    <dgm:cxn modelId="{18AC7E22-F5A8-4B45-AE2F-2FBBD79B00FB}" srcId="{20059406-BD8B-4E55-A3D8-C969D088B016}" destId="{BF768398-1F50-47BA-B413-15CFCC39EF06}" srcOrd="0" destOrd="0" parTransId="{865FC03B-0A3C-4339-8C40-902CCB541A0F}" sibTransId="{BCC051DA-1989-4043-A71C-DB5B203007E2}"/>
-    <dgm:cxn modelId="{26A9285D-CBC3-4156-B5F7-C06D59E0A096}" type="presOf" srcId="{BCC051DA-1989-4043-A71C-DB5B203007E2}" destId="{F45B4FC5-3190-478B-8897-3B75D7FA7A0D}" srcOrd="0" destOrd="0" presId="urn:microsoft.com/office/officeart/2008/layout/NameandTitleOrganizationalChart"/>
-    <dgm:cxn modelId="{00014778-BF7B-45A9-B0E8-5C1E7B32F1F0}" type="presOf" srcId="{E0DD6EDE-0D0B-431C-9595-B77CA81EA886}" destId="{DF867B46-5BD7-42DF-ACC5-EB33254E9FA6}" srcOrd="0" destOrd="0" presId="urn:microsoft.com/office/officeart/2008/layout/NameandTitleOrganizationalChart"/>
-    <dgm:cxn modelId="{DE128A50-E354-40E4-A45A-5DADABA48395}" srcId="{20059406-BD8B-4E55-A3D8-C969D088B016}" destId="{94048916-DF9A-4086-BB48-11FCC2B23560}" srcOrd="1" destOrd="0" parTransId="{D5164096-2E3E-4A76-AE62-F999EBA0BF5B}" sibTransId="{0E0DCCDB-5551-4409-93D2-F9FBEB33AEF4}"/>
-    <dgm:cxn modelId="{F4B49695-D0FA-4C68-BDF8-0C8AE9E401EC}" type="presOf" srcId="{BF768398-1F50-47BA-B413-15CFCC39EF06}" destId="{0B8256DD-B2CD-44E8-9010-00F420B14DB5}" srcOrd="0" destOrd="0" presId="urn:microsoft.com/office/officeart/2008/layout/NameandTitleOrganizationalChart"/>
-    <dgm:cxn modelId="{0E681634-313B-42BA-A51A-63BD65AC9062}" srcId="{20059406-BD8B-4E55-A3D8-C969D088B016}" destId="{AFF29BE7-25FC-4575-B4DB-7C07A43F6273}" srcOrd="2" destOrd="0" parTransId="{E0DD6EDE-0D0B-431C-9595-B77CA81EA886}" sibTransId="{34452C4A-3AD4-40CC-ABE0-61FFF178E9D3}"/>
-    <dgm:cxn modelId="{C7C20316-CB48-4C58-B5D7-0A5C1C1D44C8}" type="presOf" srcId="{0E0DCCDB-5551-4409-93D2-F9FBEB33AEF4}" destId="{085A1E17-6888-4ED1-A757-135ACFFC0060}" srcOrd="0" destOrd="0" presId="urn:microsoft.com/office/officeart/2008/layout/NameandTitleOrganizationalChart"/>
-    <dgm:cxn modelId="{D12AE26E-5917-4563-9A79-9477727D98F3}" type="presOf" srcId="{94048916-DF9A-4086-BB48-11FCC2B23560}" destId="{7C8D0D91-FAC7-441F-9D8A-E9C5D755041B}" srcOrd="0" destOrd="0" presId="urn:microsoft.com/office/officeart/2008/layout/NameandTitleOrganizationalChart"/>
+    <dgm:cxn modelId="{C1C8A121-5C51-4D89-8A06-C3B6381ACCA3}" type="presOf" srcId="{20059406-BD8B-4E55-A3D8-C969D088B016}" destId="{716ECB80-0194-4007-943B-3E4B2B747A67}" srcOrd="0" destOrd="0" presId="urn:microsoft.com/office/officeart/2008/layout/NameandTitleOrganizationalChart"/>
+    <dgm:cxn modelId="{26BA074D-742A-43E6-838B-380CFFA0A147}" type="presOf" srcId="{BF768398-1F50-47BA-B413-15CFCC39EF06}" destId="{FAAD20CC-D509-4480-8699-E1231CB7F67A}" srcOrd="1" destOrd="0" presId="urn:microsoft.com/office/officeart/2008/layout/NameandTitleOrganizationalChart"/>
     <dgm:cxn modelId="{78249B42-EE0E-4B8E-A98D-92D7AFBAA4DE}" type="presParOf" srcId="{CAC668F8-BDE7-4B23-83A3-A4A585FFEF74}" destId="{6FDF0570-80CC-455C-A13F-F88D0E951F1C}" srcOrd="0" destOrd="0" presId="urn:microsoft.com/office/officeart/2008/layout/NameandTitleOrganizationalChart"/>
     <dgm:cxn modelId="{8F3131FE-4F40-4A57-995E-715374EDC076}" type="presParOf" srcId="{6FDF0570-80CC-455C-A13F-F88D0E951F1C}" destId="{C69346A7-0024-4A26-A589-62D42A692425}" srcOrd="0" destOrd="0" presId="urn:microsoft.com/office/officeart/2008/layout/NameandTitleOrganizationalChart"/>
     <dgm:cxn modelId="{E54824F4-2AEE-4CA8-B6BA-9B098EE706DF}" type="presParOf" srcId="{C69346A7-0024-4A26-A589-62D42A692425}" destId="{716ECB80-0194-4007-943B-3E4B2B747A67}" srcOrd="0" destOrd="0" presId="urn:microsoft.com/office/officeart/2008/layout/NameandTitleOrganizationalChart"/>
@@ -1375,8 +1376,14 @@
     <dgm:cxn modelId="{1395EC62-146F-41CE-871D-C0A5882BB406}" type="presParOf" srcId="{836CFD99-48BE-400C-87B5-8D545A870066}" destId="{DE593395-09FC-440D-8484-50605E23D2A3}" srcOrd="1" destOrd="0" presId="urn:microsoft.com/office/officeart/2008/layout/NameandTitleOrganizationalChart"/>
     <dgm:cxn modelId="{425941B1-03AF-4264-9915-39C5889B3BCC}" type="presParOf" srcId="{836CFD99-48BE-400C-87B5-8D545A870066}" destId="{A803E624-FD5F-4A50-9092-F29CB0BEC3AE}" srcOrd="2" destOrd="0" presId="urn:microsoft.com/office/officeart/2008/layout/NameandTitleOrganizationalChart"/>
   </dgm:cxnLst>
-  <dgm:bg/>
-  <dgm:whole/>
+  <dgm:bg>
+    <a:noFill/>
+  </dgm:bg>
+  <dgm:whole>
+    <a:ln>
+      <a:noFill/>
+    </a:ln>
+  </dgm:whole>
   <dgm:extLst>
     <a:ext uri="http://schemas.microsoft.com/office/drawing/2008/diagram">
       <dsp:dataModelExt xmlns:dsp="http://schemas.microsoft.com/office/drawing/2008/diagram" relId="rId7" minVer="http://schemas.openxmlformats.org/drawingml/2006/diagram"/>
@@ -1648,7 +1655,7 @@
             <a:buNone/>
           </a:pPr>
           <a:r>
-            <a:rPr lang="de-AT" sz="2000" kern="1200"/>
+            <a:rPr lang="de-AT" sz="2000" kern="1200" dirty="0"/>
             <a:t>Thiago Gumhold</a:t>
           </a:r>
         </a:p>
@@ -4529,7 +4536,7 @@
           <a:p>
             <a:fld id="{748F024B-076F-4586-BF0D-4DDEFB4C70E4}" type="datetimeFigureOut">
               <a:rPr lang="de-AT" smtClean="0"/>
-              <a:t>20.01.2017</a:t>
+              <a:t>22.01.2017</a:t>
             </a:fld>
             <a:endParaRPr lang="de-AT"/>
           </a:p>
@@ -5053,7 +5060,7 @@
             </a:r>
             <a:r>
               <a:rPr lang="de-AT" dirty="0" err="1"/>
-              <a:t>reffresh</a:t>
+              <a:t>refresh</a:t>
             </a:r>
             <a:r>
               <a:rPr lang="de-AT" dirty="0"/>
@@ -5075,6 +5082,121 @@
               <a:rPr lang="de-AT" dirty="0"/>
               <a:t>:</a:t>
             </a:r>
+            <a:br>
+              <a:rPr lang="de-AT" dirty="0"/>
+            </a:br>
+            <a:r>
+              <a:rPr lang="de-AT" dirty="0"/>
+              <a:t>Talk </a:t>
+            </a:r>
+            <a:r>
+              <a:rPr lang="de-AT" dirty="0" err="1"/>
+              <a:t>about</a:t>
+            </a:r>
+            <a:r>
+              <a:rPr lang="de-AT" dirty="0"/>
+              <a:t> </a:t>
+            </a:r>
+            <a:r>
+              <a:rPr lang="de-AT" dirty="0" err="1"/>
+              <a:t>us</a:t>
+            </a:r>
+            <a:r>
+              <a:rPr lang="de-AT" dirty="0"/>
+              <a:t> </a:t>
+            </a:r>
+            <a:r>
+              <a:rPr lang="de-AT" dirty="0" err="1"/>
+              <a:t>and</a:t>
+            </a:r>
+            <a:r>
+              <a:rPr lang="de-AT" dirty="0"/>
+              <a:t> </a:t>
+            </a:r>
+            <a:r>
+              <a:rPr lang="de-AT" dirty="0" err="1"/>
+              <a:t>our</a:t>
+            </a:r>
+            <a:r>
+              <a:rPr lang="de-AT" dirty="0"/>
+              <a:t> „</a:t>
+            </a:r>
+            <a:r>
+              <a:rPr lang="de-AT" dirty="0" err="1"/>
+              <a:t>jobs</a:t>
+            </a:r>
+            <a:r>
+              <a:rPr lang="de-AT" dirty="0"/>
+              <a:t>“</a:t>
+            </a:r>
+            <a:br>
+              <a:rPr lang="de-AT" dirty="0"/>
+            </a:br>
+            <a:r>
+              <a:rPr lang="de-AT" dirty="0"/>
+              <a:t>Talk </a:t>
+            </a:r>
+            <a:r>
+              <a:rPr lang="de-AT" dirty="0" err="1"/>
+              <a:t>about</a:t>
+            </a:r>
+            <a:r>
+              <a:rPr lang="de-AT" dirty="0"/>
+              <a:t> </a:t>
+            </a:r>
+            <a:r>
+              <a:rPr lang="de-AT" dirty="0" err="1"/>
+              <a:t>our</a:t>
+            </a:r>
+            <a:r>
+              <a:rPr lang="de-AT" dirty="0"/>
+              <a:t> Project </a:t>
+            </a:r>
+            <a:r>
+              <a:rPr lang="de-AT" dirty="0" err="1"/>
+              <a:t>and</a:t>
+            </a:r>
+            <a:r>
+              <a:rPr lang="de-AT" dirty="0"/>
+              <a:t> </a:t>
+            </a:r>
+            <a:r>
+              <a:rPr lang="de-AT" dirty="0" err="1"/>
+              <a:t>explain</a:t>
+            </a:r>
+            <a:r>
+              <a:rPr lang="de-AT" dirty="0"/>
+              <a:t> </a:t>
+            </a:r>
+            <a:r>
+              <a:rPr lang="de-AT" dirty="0" err="1"/>
+              <a:t>it</a:t>
+            </a:r>
+            <a:r>
+              <a:rPr lang="de-AT" dirty="0"/>
+              <a:t> </a:t>
+            </a:r>
+            <a:r>
+              <a:rPr lang="de-AT" dirty="0" err="1"/>
+              <a:t>as</a:t>
+            </a:r>
+            <a:r>
+              <a:rPr lang="de-AT" dirty="0"/>
+              <a:t> simple </a:t>
+            </a:r>
+            <a:r>
+              <a:rPr lang="de-AT" dirty="0" err="1"/>
+              <a:t>as</a:t>
+            </a:r>
+            <a:r>
+              <a:rPr lang="de-AT" dirty="0"/>
+              <a:t> </a:t>
+            </a:r>
+            <a:r>
+              <a:rPr lang="de-AT" dirty="0" err="1"/>
+              <a:t>possible</a:t>
+            </a:r>
+            <a:endParaRPr lang="de-AT" dirty="0"/>
           </a:p>
           <a:p>
             <a:r>
@@ -5171,6 +5293,449 @@
           <a:p>
             <a:r>
               <a:rPr lang="de-AT" dirty="0"/>
+              <a:t>Talk </a:t>
+            </a:r>
+            <a:r>
+              <a:rPr lang="de-AT" dirty="0" err="1"/>
+              <a:t>eventually</a:t>
+            </a:r>
+            <a:r>
+              <a:rPr lang="de-AT" dirty="0"/>
+              <a:t> </a:t>
+            </a:r>
+            <a:r>
+              <a:rPr lang="de-AT" dirty="0" err="1"/>
+              <a:t>about</a:t>
+            </a:r>
+            <a:r>
+              <a:rPr lang="de-AT" dirty="0"/>
+              <a:t> </a:t>
+            </a:r>
+            <a:r>
+              <a:rPr lang="de-AT" dirty="0" err="1"/>
+              <a:t>motivation</a:t>
+            </a:r>
+            <a:r>
+              <a:rPr lang="de-AT" dirty="0"/>
+              <a:t> </a:t>
+            </a:r>
+            <a:r>
+              <a:rPr lang="de-AT" dirty="0" err="1"/>
+              <a:t>for</a:t>
+            </a:r>
+            <a:r>
+              <a:rPr lang="de-AT" dirty="0"/>
+              <a:t> </a:t>
+            </a:r>
+            <a:r>
+              <a:rPr lang="de-AT" dirty="0" err="1"/>
+              <a:t>roject</a:t>
+            </a:r>
+            <a:r>
+              <a:rPr lang="de-AT" dirty="0"/>
+              <a:t> in </a:t>
+            </a:r>
+            <a:r>
+              <a:rPr lang="de-AT" dirty="0" err="1"/>
+              <a:t>the</a:t>
+            </a:r>
+            <a:r>
+              <a:rPr lang="de-AT" dirty="0"/>
+              <a:t> </a:t>
+            </a:r>
+            <a:r>
+              <a:rPr lang="de-AT" dirty="0" err="1"/>
+              <a:t>first</a:t>
+            </a:r>
+            <a:r>
+              <a:rPr lang="de-AT" dirty="0"/>
+              <a:t> </a:t>
+            </a:r>
+            <a:r>
+              <a:rPr lang="de-AT" dirty="0" err="1"/>
+              <a:t>place</a:t>
+            </a:r>
+            <a:endParaRPr lang="de-AT" dirty="0"/>
+          </a:p>
+          <a:p>
+            <a:r>
+              <a:rPr lang="de-AT" dirty="0"/>
+              <a:t>Talk </a:t>
+            </a:r>
+            <a:r>
+              <a:rPr lang="de-AT" dirty="0" err="1"/>
+              <a:t>about</a:t>
+            </a:r>
+            <a:r>
+              <a:rPr lang="de-AT" dirty="0"/>
+              <a:t> </a:t>
+            </a:r>
+            <a:r>
+              <a:rPr lang="de-AT" dirty="0" err="1"/>
+              <a:t>our</a:t>
+            </a:r>
+            <a:r>
+              <a:rPr lang="de-AT" dirty="0"/>
+              <a:t> </a:t>
+            </a:r>
+            <a:r>
+              <a:rPr lang="de-AT" dirty="0" err="1"/>
+              <a:t>workflow</a:t>
+            </a:r>
+            <a:r>
+              <a:rPr lang="de-AT" dirty="0"/>
+              <a:t>, </a:t>
+            </a:r>
+            <a:br>
+              <a:rPr lang="de-AT" dirty="0"/>
+            </a:br>
+            <a:r>
+              <a:rPr lang="de-AT" dirty="0" err="1"/>
+              <a:t>talk</a:t>
+            </a:r>
+            <a:r>
+              <a:rPr lang="de-AT" dirty="0"/>
+              <a:t> </a:t>
+            </a:r>
+            <a:r>
+              <a:rPr lang="de-AT" dirty="0" err="1"/>
+              <a:t>about</a:t>
+            </a:r>
+            <a:r>
+              <a:rPr lang="de-AT" dirty="0"/>
+              <a:t> </a:t>
+            </a:r>
+            <a:r>
+              <a:rPr lang="de-AT" dirty="0" err="1"/>
+              <a:t>our</a:t>
+            </a:r>
+            <a:r>
+              <a:rPr lang="de-AT" dirty="0"/>
+              <a:t> PM </a:t>
+            </a:r>
+            <a:r>
+              <a:rPr lang="de-AT" dirty="0" err="1"/>
+              <a:t>construct</a:t>
+            </a:r>
+            <a:r>
+              <a:rPr lang="de-AT" dirty="0"/>
+              <a:t> </a:t>
+            </a:r>
+            <a:r>
+              <a:rPr lang="de-AT" dirty="0" err="1"/>
+              <a:t>that</a:t>
+            </a:r>
+            <a:r>
+              <a:rPr lang="de-AT" dirty="0"/>
+              <a:t> </a:t>
+            </a:r>
+            <a:r>
+              <a:rPr lang="de-AT" dirty="0" err="1"/>
+              <a:t>should</a:t>
+            </a:r>
+            <a:r>
+              <a:rPr lang="de-AT" dirty="0"/>
+              <a:t> </a:t>
+            </a:r>
+            <a:r>
+              <a:rPr lang="de-AT" dirty="0" err="1"/>
+              <a:t>have</a:t>
+            </a:r>
+            <a:r>
+              <a:rPr lang="de-AT" dirty="0"/>
+              <a:t> </a:t>
+            </a:r>
+            <a:r>
+              <a:rPr lang="de-AT" dirty="0" err="1"/>
+              <a:t>made</a:t>
+            </a:r>
+            <a:r>
+              <a:rPr lang="de-AT" dirty="0"/>
+              <a:t> </a:t>
+            </a:r>
+            <a:r>
+              <a:rPr lang="de-AT" dirty="0" err="1"/>
+              <a:t>our</a:t>
+            </a:r>
+            <a:r>
+              <a:rPr lang="de-AT" dirty="0"/>
+              <a:t> </a:t>
+            </a:r>
+            <a:r>
+              <a:rPr lang="de-AT" dirty="0" err="1"/>
+              <a:t>lives</a:t>
+            </a:r>
+            <a:r>
+              <a:rPr lang="de-AT" dirty="0"/>
+              <a:t> </a:t>
+            </a:r>
+            <a:r>
+              <a:rPr lang="de-AT" dirty="0" err="1"/>
+              <a:t>easier</a:t>
+            </a:r>
+            <a:r>
+              <a:rPr lang="de-AT" dirty="0"/>
+              <a:t> (</a:t>
+            </a:r>
+            <a:r>
+              <a:rPr lang="de-AT" dirty="0" err="1"/>
+              <a:t>GitHub</a:t>
+            </a:r>
+            <a:r>
+              <a:rPr lang="de-AT" dirty="0"/>
+              <a:t>, </a:t>
+            </a:r>
+            <a:r>
+              <a:rPr lang="de-AT" dirty="0" err="1"/>
+              <a:t>arbeitszeitaufzeichnung</a:t>
+            </a:r>
+            <a:r>
+              <a:rPr lang="de-AT" dirty="0"/>
+              <a:t>, </a:t>
+            </a:r>
+            <a:r>
+              <a:rPr lang="de-AT" dirty="0" err="1"/>
+              <a:t>testing</a:t>
+            </a:r>
+            <a:r>
+              <a:rPr lang="de-AT" dirty="0"/>
+              <a:t>, </a:t>
+            </a:r>
+            <a:r>
+              <a:rPr lang="de-AT" dirty="0" err="1"/>
+              <a:t>and</a:t>
+            </a:r>
+            <a:r>
+              <a:rPr lang="de-AT" dirty="0"/>
+              <a:t> so on)</a:t>
+            </a:r>
+          </a:p>
+          <a:p>
+            <a:r>
+              <a:rPr lang="de-AT" dirty="0"/>
+              <a:t>	</a:t>
+            </a:r>
+            <a:r>
+              <a:rPr lang="de-AT" dirty="0" err="1"/>
+              <a:t>GitHub</a:t>
+            </a:r>
+            <a:r>
+              <a:rPr lang="de-AT" dirty="0"/>
+              <a:t> </a:t>
+            </a:r>
+            <a:r>
+              <a:rPr lang="de-AT" dirty="0" err="1"/>
+              <a:t>paired</a:t>
+            </a:r>
+            <a:r>
+              <a:rPr lang="de-AT" dirty="0"/>
+              <a:t> </a:t>
+            </a:r>
+            <a:r>
+              <a:rPr lang="de-AT" dirty="0" err="1"/>
+              <a:t>with</a:t>
+            </a:r>
+            <a:r>
+              <a:rPr lang="de-AT" dirty="0"/>
+              <a:t> </a:t>
+            </a:r>
+            <a:r>
+              <a:rPr lang="de-AT" dirty="0" err="1"/>
+              <a:t>PhpStorm</a:t>
+            </a:r>
+            <a:r>
+              <a:rPr lang="de-AT" dirty="0"/>
+              <a:t> was </a:t>
+            </a:r>
+            <a:r>
+              <a:rPr lang="de-AT" dirty="0" err="1"/>
+              <a:t>our</a:t>
+            </a:r>
+            <a:r>
+              <a:rPr lang="de-AT" dirty="0"/>
+              <a:t> </a:t>
+            </a:r>
+            <a:r>
+              <a:rPr lang="de-AT" dirty="0" err="1"/>
+              <a:t>primary</a:t>
+            </a:r>
+            <a:r>
+              <a:rPr lang="de-AT" dirty="0"/>
+              <a:t> </a:t>
+            </a:r>
+            <a:r>
+              <a:rPr lang="de-AT" dirty="0" err="1"/>
+              <a:t>development</a:t>
+            </a:r>
+            <a:r>
+              <a:rPr lang="de-AT" dirty="0"/>
+              <a:t> </a:t>
+            </a:r>
+            <a:r>
+              <a:rPr lang="de-AT" dirty="0" err="1"/>
+              <a:t>tool</a:t>
+            </a:r>
+            <a:endParaRPr lang="de-AT" dirty="0"/>
+          </a:p>
+          <a:p>
+            <a:r>
+              <a:rPr lang="de-AT" dirty="0" err="1"/>
+              <a:t>Then</a:t>
+            </a:r>
+            <a:r>
+              <a:rPr lang="de-AT" dirty="0"/>
+              <a:t> </a:t>
+            </a:r>
+            <a:r>
+              <a:rPr lang="de-AT" dirty="0" err="1"/>
+              <a:t>talk</a:t>
+            </a:r>
+            <a:r>
+              <a:rPr lang="de-AT" dirty="0"/>
+              <a:t> </a:t>
+            </a:r>
+            <a:r>
+              <a:rPr lang="de-AT" dirty="0" err="1"/>
+              <a:t>about</a:t>
+            </a:r>
+            <a:r>
+              <a:rPr lang="de-AT" dirty="0"/>
+              <a:t> </a:t>
+            </a:r>
+            <a:r>
+              <a:rPr lang="de-AT" dirty="0" err="1"/>
+              <a:t>the</a:t>
+            </a:r>
+            <a:r>
+              <a:rPr lang="de-AT" dirty="0"/>
+              <a:t> </a:t>
+            </a:r>
+            <a:r>
+              <a:rPr lang="de-AT" dirty="0" err="1"/>
+              <a:t>general</a:t>
+            </a:r>
+            <a:r>
+              <a:rPr lang="de-AT" dirty="0"/>
+              <a:t> </a:t>
+            </a:r>
+            <a:r>
+              <a:rPr lang="de-AT" dirty="0" err="1"/>
+              <a:t>feeling</a:t>
+            </a:r>
+            <a:r>
+              <a:rPr lang="de-AT" dirty="0"/>
+              <a:t> </a:t>
+            </a:r>
+            <a:r>
+              <a:rPr lang="de-AT" dirty="0" err="1"/>
+              <a:t>of</a:t>
+            </a:r>
+            <a:r>
+              <a:rPr lang="de-AT" dirty="0"/>
+              <a:t> </a:t>
+            </a:r>
+            <a:r>
+              <a:rPr lang="de-AT" dirty="0" err="1"/>
+              <a:t>how</a:t>
+            </a:r>
+            <a:r>
+              <a:rPr lang="de-AT" dirty="0"/>
+              <a:t> </a:t>
+            </a:r>
+            <a:r>
+              <a:rPr lang="de-AT" dirty="0" err="1"/>
+              <a:t>we</a:t>
+            </a:r>
+            <a:r>
+              <a:rPr lang="de-AT" dirty="0"/>
+              <a:t> </a:t>
+            </a:r>
+            <a:r>
+              <a:rPr lang="de-AT" dirty="0" err="1"/>
+              <a:t>think</a:t>
+            </a:r>
+            <a:r>
+              <a:rPr lang="de-AT" dirty="0"/>
+              <a:t> </a:t>
+            </a:r>
+            <a:r>
+              <a:rPr lang="de-AT" dirty="0" err="1"/>
+              <a:t>it</a:t>
+            </a:r>
+            <a:r>
+              <a:rPr lang="de-AT" dirty="0"/>
+              <a:t> </a:t>
+            </a:r>
+            <a:r>
+              <a:rPr lang="de-AT" dirty="0" err="1"/>
+              <a:t>turned</a:t>
+            </a:r>
+            <a:r>
+              <a:rPr lang="de-AT" dirty="0"/>
+              <a:t> out</a:t>
+            </a:r>
+          </a:p>
+          <a:p>
+            <a:r>
+              <a:rPr lang="de-AT" dirty="0" err="1"/>
+              <a:t>And</a:t>
+            </a:r>
+            <a:r>
+              <a:rPr lang="de-AT" dirty="0"/>
+              <a:t> </a:t>
+            </a:r>
+            <a:r>
+              <a:rPr lang="de-AT" dirty="0" err="1"/>
+              <a:t>how</a:t>
+            </a:r>
+            <a:r>
+              <a:rPr lang="de-AT" dirty="0"/>
+              <a:t> </a:t>
+            </a:r>
+            <a:r>
+              <a:rPr lang="de-AT" dirty="0" err="1"/>
+              <a:t>it</a:t>
+            </a:r>
+            <a:r>
+              <a:rPr lang="de-AT" dirty="0"/>
+              <a:t> </a:t>
+            </a:r>
+            <a:r>
+              <a:rPr lang="de-AT" dirty="0" err="1"/>
+              <a:t>really</a:t>
+            </a:r>
+            <a:r>
+              <a:rPr lang="de-AT" dirty="0"/>
+              <a:t> </a:t>
+            </a:r>
+            <a:r>
+              <a:rPr lang="de-AT" dirty="0" err="1"/>
+              <a:t>turned</a:t>
+            </a:r>
+            <a:r>
+              <a:rPr lang="de-AT" dirty="0"/>
+              <a:t> out: </a:t>
+            </a:r>
+            <a:r>
+              <a:rPr lang="de-AT" dirty="0" err="1"/>
+              <a:t>Statistics</a:t>
+            </a:r>
+            <a:r>
+              <a:rPr lang="de-AT" dirty="0"/>
+              <a:t> on </a:t>
+            </a:r>
+            <a:r>
+              <a:rPr lang="de-AT" dirty="0" err="1"/>
+              <a:t>everything</a:t>
+            </a:r>
+            <a:r>
+              <a:rPr lang="de-AT" dirty="0"/>
+              <a:t>…</a:t>
+            </a:r>
+          </a:p>
+          <a:p>
+            <a:r>
+              <a:rPr lang="de-AT" dirty="0"/>
               <a:t>Mach ich</a:t>
             </a:r>
           </a:p>
@@ -5258,7 +5823,450 @@
           <a:p>
             <a:r>
               <a:rPr lang="de-AT" dirty="0"/>
-              <a:t>Macht der Alex</a:t>
+              <a:t>Talk </a:t>
+            </a:r>
+            <a:r>
+              <a:rPr lang="de-AT" dirty="0" err="1"/>
+              <a:t>eventually</a:t>
+            </a:r>
+            <a:r>
+              <a:rPr lang="de-AT" dirty="0"/>
+              <a:t> </a:t>
+            </a:r>
+            <a:r>
+              <a:rPr lang="de-AT" dirty="0" err="1"/>
+              <a:t>about</a:t>
+            </a:r>
+            <a:r>
+              <a:rPr lang="de-AT" dirty="0"/>
+              <a:t> </a:t>
+            </a:r>
+            <a:r>
+              <a:rPr lang="de-AT" dirty="0" err="1"/>
+              <a:t>motivation</a:t>
+            </a:r>
+            <a:r>
+              <a:rPr lang="de-AT" dirty="0"/>
+              <a:t> </a:t>
+            </a:r>
+            <a:r>
+              <a:rPr lang="de-AT" dirty="0" err="1"/>
+              <a:t>for</a:t>
+            </a:r>
+            <a:r>
+              <a:rPr lang="de-AT" dirty="0"/>
+              <a:t> </a:t>
+            </a:r>
+            <a:r>
+              <a:rPr lang="de-AT" dirty="0" err="1"/>
+              <a:t>roject</a:t>
+            </a:r>
+            <a:r>
+              <a:rPr lang="de-AT" dirty="0"/>
+              <a:t> in </a:t>
+            </a:r>
+            <a:r>
+              <a:rPr lang="de-AT" dirty="0" err="1"/>
+              <a:t>the</a:t>
+            </a:r>
+            <a:r>
+              <a:rPr lang="de-AT" dirty="0"/>
+              <a:t> </a:t>
+            </a:r>
+            <a:r>
+              <a:rPr lang="de-AT" dirty="0" err="1"/>
+              <a:t>first</a:t>
+            </a:r>
+            <a:r>
+              <a:rPr lang="de-AT" dirty="0"/>
+              <a:t> </a:t>
+            </a:r>
+            <a:r>
+              <a:rPr lang="de-AT" dirty="0" err="1"/>
+              <a:t>place</a:t>
+            </a:r>
+            <a:endParaRPr lang="de-AT" dirty="0"/>
+          </a:p>
+          <a:p>
+            <a:r>
+              <a:rPr lang="de-AT" dirty="0"/>
+              <a:t>Talk </a:t>
+            </a:r>
+            <a:r>
+              <a:rPr lang="de-AT" dirty="0" err="1"/>
+              <a:t>about</a:t>
+            </a:r>
+            <a:r>
+              <a:rPr lang="de-AT" dirty="0"/>
+              <a:t> </a:t>
+            </a:r>
+            <a:r>
+              <a:rPr lang="de-AT" dirty="0" err="1"/>
+              <a:t>our</a:t>
+            </a:r>
+            <a:r>
+              <a:rPr lang="de-AT" dirty="0"/>
+              <a:t> </a:t>
+            </a:r>
+            <a:r>
+              <a:rPr lang="de-AT" dirty="0" err="1"/>
+              <a:t>workflow</a:t>
+            </a:r>
+            <a:r>
+              <a:rPr lang="de-AT" dirty="0"/>
+              <a:t>, </a:t>
+            </a:r>
+            <a:br>
+              <a:rPr lang="de-AT" dirty="0"/>
+            </a:br>
+            <a:r>
+              <a:rPr lang="de-AT" dirty="0" err="1"/>
+              <a:t>talk</a:t>
+            </a:r>
+            <a:r>
+              <a:rPr lang="de-AT" dirty="0"/>
+              <a:t> </a:t>
+            </a:r>
+            <a:r>
+              <a:rPr lang="de-AT" dirty="0" err="1"/>
+              <a:t>about</a:t>
+            </a:r>
+            <a:r>
+              <a:rPr lang="de-AT" dirty="0"/>
+              <a:t> </a:t>
+            </a:r>
+            <a:r>
+              <a:rPr lang="de-AT" dirty="0" err="1"/>
+              <a:t>our</a:t>
+            </a:r>
+            <a:r>
+              <a:rPr lang="de-AT" dirty="0"/>
+              <a:t> PM </a:t>
+            </a:r>
+            <a:r>
+              <a:rPr lang="de-AT" dirty="0" err="1"/>
+              <a:t>construct</a:t>
+            </a:r>
+            <a:r>
+              <a:rPr lang="de-AT" dirty="0"/>
+              <a:t> </a:t>
+            </a:r>
+            <a:r>
+              <a:rPr lang="de-AT" dirty="0" err="1"/>
+              <a:t>that</a:t>
+            </a:r>
+            <a:r>
+              <a:rPr lang="de-AT" dirty="0"/>
+              <a:t> </a:t>
+            </a:r>
+            <a:r>
+              <a:rPr lang="de-AT" dirty="0" err="1"/>
+              <a:t>should</a:t>
+            </a:r>
+            <a:r>
+              <a:rPr lang="de-AT" dirty="0"/>
+              <a:t> </a:t>
+            </a:r>
+            <a:r>
+              <a:rPr lang="de-AT" dirty="0" err="1"/>
+              <a:t>have</a:t>
+            </a:r>
+            <a:r>
+              <a:rPr lang="de-AT" dirty="0"/>
+              <a:t> </a:t>
+            </a:r>
+            <a:r>
+              <a:rPr lang="de-AT" dirty="0" err="1"/>
+              <a:t>made</a:t>
+            </a:r>
+            <a:r>
+              <a:rPr lang="de-AT" dirty="0"/>
+              <a:t> </a:t>
+            </a:r>
+            <a:r>
+              <a:rPr lang="de-AT" dirty="0" err="1"/>
+              <a:t>our</a:t>
+            </a:r>
+            <a:r>
+              <a:rPr lang="de-AT" dirty="0"/>
+              <a:t> </a:t>
+            </a:r>
+            <a:r>
+              <a:rPr lang="de-AT" dirty="0" err="1"/>
+              <a:t>lives</a:t>
+            </a:r>
+            <a:r>
+              <a:rPr lang="de-AT" dirty="0"/>
+              <a:t> </a:t>
+            </a:r>
+            <a:r>
+              <a:rPr lang="de-AT" dirty="0" err="1"/>
+              <a:t>easier</a:t>
+            </a:r>
+            <a:r>
+              <a:rPr lang="de-AT" dirty="0"/>
+              <a:t> (</a:t>
+            </a:r>
+            <a:r>
+              <a:rPr lang="de-AT" dirty="0" err="1"/>
+              <a:t>GitHub</a:t>
+            </a:r>
+            <a:r>
+              <a:rPr lang="de-AT" dirty="0"/>
+              <a:t>, </a:t>
+            </a:r>
+            <a:r>
+              <a:rPr lang="de-AT" dirty="0" err="1"/>
+              <a:t>arbeitszeitaufzeichnung</a:t>
+            </a:r>
+            <a:r>
+              <a:rPr lang="de-AT" dirty="0"/>
+              <a:t>, </a:t>
+            </a:r>
+            <a:r>
+              <a:rPr lang="de-AT" dirty="0" err="1"/>
+              <a:t>testing</a:t>
+            </a:r>
+            <a:r>
+              <a:rPr lang="de-AT" dirty="0"/>
+              <a:t>, </a:t>
+            </a:r>
+            <a:r>
+              <a:rPr lang="de-AT" dirty="0" err="1"/>
+              <a:t>and</a:t>
+            </a:r>
+            <a:r>
+              <a:rPr lang="de-AT" dirty="0"/>
+              <a:t> so on)</a:t>
+            </a:r>
+          </a:p>
+          <a:p>
+            <a:r>
+              <a:rPr lang="de-AT" dirty="0"/>
+              <a:t>	</a:t>
+            </a:r>
+            <a:r>
+              <a:rPr lang="de-AT" dirty="0" err="1"/>
+              <a:t>GitHub</a:t>
+            </a:r>
+            <a:r>
+              <a:rPr lang="de-AT" dirty="0"/>
+              <a:t> </a:t>
+            </a:r>
+            <a:r>
+              <a:rPr lang="de-AT" dirty="0" err="1"/>
+              <a:t>paired</a:t>
+            </a:r>
+            <a:r>
+              <a:rPr lang="de-AT" dirty="0"/>
+              <a:t> </a:t>
+            </a:r>
+            <a:r>
+              <a:rPr lang="de-AT" dirty="0" err="1"/>
+              <a:t>with</a:t>
+            </a:r>
+            <a:r>
+              <a:rPr lang="de-AT" dirty="0"/>
+              <a:t> </a:t>
+            </a:r>
+            <a:r>
+              <a:rPr lang="de-AT" dirty="0" err="1"/>
+              <a:t>PhpStorm</a:t>
+            </a:r>
+            <a:r>
+              <a:rPr lang="de-AT" dirty="0"/>
+              <a:t> was </a:t>
+            </a:r>
+            <a:r>
+              <a:rPr lang="de-AT" dirty="0" err="1"/>
+              <a:t>our</a:t>
+            </a:r>
+            <a:r>
+              <a:rPr lang="de-AT" dirty="0"/>
+              <a:t> </a:t>
+            </a:r>
+            <a:r>
+              <a:rPr lang="de-AT" dirty="0" err="1"/>
+              <a:t>primary</a:t>
+            </a:r>
+            <a:r>
+              <a:rPr lang="de-AT" dirty="0"/>
+              <a:t> </a:t>
+            </a:r>
+            <a:r>
+              <a:rPr lang="de-AT" dirty="0" err="1"/>
+              <a:t>development</a:t>
+            </a:r>
+            <a:r>
+              <a:rPr lang="de-AT" dirty="0"/>
+              <a:t> </a:t>
+            </a:r>
+            <a:r>
+              <a:rPr lang="de-AT" dirty="0" err="1"/>
+              <a:t>tool</a:t>
+            </a:r>
+            <a:endParaRPr lang="de-AT" dirty="0"/>
+          </a:p>
+          <a:p>
+            <a:r>
+              <a:rPr lang="de-AT" dirty="0" err="1"/>
+              <a:t>Then</a:t>
+            </a:r>
+            <a:r>
+              <a:rPr lang="de-AT" dirty="0"/>
+              <a:t> </a:t>
+            </a:r>
+            <a:r>
+              <a:rPr lang="de-AT" dirty="0" err="1"/>
+              <a:t>talk</a:t>
+            </a:r>
+            <a:r>
+              <a:rPr lang="de-AT" dirty="0"/>
+              <a:t> </a:t>
+            </a:r>
+            <a:r>
+              <a:rPr lang="de-AT" dirty="0" err="1"/>
+              <a:t>about</a:t>
+            </a:r>
+            <a:r>
+              <a:rPr lang="de-AT" dirty="0"/>
+              <a:t> </a:t>
+            </a:r>
+            <a:r>
+              <a:rPr lang="de-AT" dirty="0" err="1"/>
+              <a:t>the</a:t>
+            </a:r>
+            <a:r>
+              <a:rPr lang="de-AT" dirty="0"/>
+              <a:t> </a:t>
+            </a:r>
+            <a:r>
+              <a:rPr lang="de-AT" dirty="0" err="1"/>
+              <a:t>general</a:t>
+            </a:r>
+            <a:r>
+              <a:rPr lang="de-AT" dirty="0"/>
+              <a:t> </a:t>
+            </a:r>
+            <a:r>
+              <a:rPr lang="de-AT" dirty="0" err="1"/>
+              <a:t>feeling</a:t>
+            </a:r>
+            <a:r>
+              <a:rPr lang="de-AT" dirty="0"/>
+              <a:t> </a:t>
+            </a:r>
+            <a:r>
+              <a:rPr lang="de-AT" dirty="0" err="1"/>
+              <a:t>of</a:t>
+            </a:r>
+            <a:r>
+              <a:rPr lang="de-AT" dirty="0"/>
+              <a:t> </a:t>
+            </a:r>
+            <a:r>
+              <a:rPr lang="de-AT" dirty="0" err="1"/>
+              <a:t>how</a:t>
+            </a:r>
+            <a:r>
+              <a:rPr lang="de-AT" dirty="0"/>
+              <a:t> </a:t>
+            </a:r>
+            <a:r>
+              <a:rPr lang="de-AT" dirty="0" err="1"/>
+              <a:t>we</a:t>
+            </a:r>
+            <a:r>
+              <a:rPr lang="de-AT" dirty="0"/>
+              <a:t> </a:t>
+            </a:r>
+            <a:r>
+              <a:rPr lang="de-AT" dirty="0" err="1"/>
+              <a:t>think</a:t>
+            </a:r>
+            <a:r>
+              <a:rPr lang="de-AT" dirty="0"/>
+              <a:t> </a:t>
+            </a:r>
+            <a:r>
+              <a:rPr lang="de-AT" dirty="0" err="1"/>
+              <a:t>it</a:t>
+            </a:r>
+            <a:r>
+              <a:rPr lang="de-AT" dirty="0"/>
+              <a:t> </a:t>
+            </a:r>
+            <a:r>
+              <a:rPr lang="de-AT" dirty="0" err="1"/>
+              <a:t>turned</a:t>
+            </a:r>
+            <a:r>
+              <a:rPr lang="de-AT" dirty="0"/>
+              <a:t> out</a:t>
+            </a:r>
+          </a:p>
+          <a:p>
+            <a:r>
+              <a:rPr lang="de-AT" dirty="0" err="1"/>
+              <a:t>And</a:t>
+            </a:r>
+            <a:r>
+              <a:rPr lang="de-AT" dirty="0"/>
+              <a:t> </a:t>
+            </a:r>
+            <a:r>
+              <a:rPr lang="de-AT" dirty="0" err="1"/>
+              <a:t>how</a:t>
+            </a:r>
+            <a:r>
+              <a:rPr lang="de-AT" dirty="0"/>
+              <a:t> </a:t>
+            </a:r>
+            <a:r>
+              <a:rPr lang="de-AT" dirty="0" err="1"/>
+              <a:t>it</a:t>
+            </a:r>
+            <a:r>
+              <a:rPr lang="de-AT" dirty="0"/>
+              <a:t> </a:t>
+            </a:r>
+            <a:r>
+              <a:rPr lang="de-AT" dirty="0" err="1"/>
+              <a:t>really</a:t>
+            </a:r>
+            <a:r>
+              <a:rPr lang="de-AT" dirty="0"/>
+              <a:t> </a:t>
+            </a:r>
+            <a:r>
+              <a:rPr lang="de-AT" dirty="0" err="1"/>
+              <a:t>turned</a:t>
+            </a:r>
+            <a:r>
+              <a:rPr lang="de-AT" dirty="0"/>
+              <a:t> out: </a:t>
+            </a:r>
+            <a:r>
+              <a:rPr lang="de-AT" dirty="0" err="1"/>
+              <a:t>Statistics</a:t>
+            </a:r>
+            <a:r>
+              <a:rPr lang="de-AT" dirty="0"/>
+              <a:t> on </a:t>
+            </a:r>
+            <a:r>
+              <a:rPr lang="de-AT" dirty="0" err="1"/>
+              <a:t>everything</a:t>
+            </a:r>
+            <a:r>
+              <a:rPr lang="de-AT" dirty="0"/>
+              <a:t>…</a:t>
+            </a:r>
+          </a:p>
+          <a:p>
+            <a:r>
+              <a:rPr lang="de-AT" dirty="0"/>
+              <a:t>Mach ich</a:t>
             </a:r>
           </a:p>
         </p:txBody>
@@ -5289,7 +6297,7 @@
     </p:spTree>
     <p:extLst>
       <p:ext uri="{BB962C8B-B14F-4D97-AF65-F5344CB8AC3E}">
-        <p14:creationId xmlns:p14="http://schemas.microsoft.com/office/powerpoint/2010/main" val="3110576319"/>
+        <p14:creationId xmlns:p14="http://schemas.microsoft.com/office/powerpoint/2010/main" val="759231529"/>
       </p:ext>
     </p:extLst>
   </p:cSld>
@@ -5345,13 +6353,8 @@
           <a:p>
             <a:r>
               <a:rPr lang="de-AT" dirty="0"/>
-              <a:t>Macht </a:t>
-            </a:r>
-            <a:r>
-              <a:rPr lang="de-AT" dirty="0" err="1"/>
-              <a:t>phillp</a:t>
-            </a:r>
-            <a:endParaRPr lang="de-AT" dirty="0"/>
+              <a:t>Macht der Alex</a:t>
+            </a:r>
           </a:p>
         </p:txBody>
       </p:sp>
@@ -5373,6 +6376,98 @@
             <a:fld id="{FFB944FA-82A2-4D87-AF4C-32D6F3284FD2}" type="slidenum">
               <a:rPr lang="de-AT" smtClean="0"/>
               <a:t>6</a:t>
+            </a:fld>
+            <a:endParaRPr lang="de-AT"/>
+          </a:p>
+        </p:txBody>
+      </p:sp>
+    </p:spTree>
+    <p:extLst>
+      <p:ext uri="{BB962C8B-B14F-4D97-AF65-F5344CB8AC3E}">
+        <p14:creationId xmlns:p14="http://schemas.microsoft.com/office/powerpoint/2010/main" val="3110576319"/>
+      </p:ext>
+    </p:extLst>
+  </p:cSld>
+  <p:clrMapOvr>
+    <a:masterClrMapping/>
+  </p:clrMapOvr>
+</p:notes>
+</file>
+
+<file path=ppt/notesSlides/notesSlide6.xml><?xml version="1.0" encoding="utf-8"?>
+<p:notes xmlns:a="http://schemas.openxmlformats.org/drawingml/2006/main" xmlns:r="http://schemas.openxmlformats.org/officeDocument/2006/relationships" xmlns:p="http://schemas.openxmlformats.org/presentationml/2006/main">
+  <p:cSld>
+    <p:spTree>
+      <p:nvGrpSpPr>
+        <p:cNvPr id="1" name=""/>
+        <p:cNvGrpSpPr/>
+        <p:nvPr/>
+      </p:nvGrpSpPr>
+      <p:grpSpPr>
+        <a:xfrm>
+          <a:off x="0" y="0"/>
+          <a:ext cx="0" cy="0"/>
+          <a:chOff x="0" y="0"/>
+          <a:chExt cx="0" cy="0"/>
+        </a:xfrm>
+      </p:grpSpPr>
+      <p:sp>
+        <p:nvSpPr>
+          <p:cNvPr id="2" name="Folienbildplatzhalter 1"/>
+          <p:cNvSpPr>
+            <a:spLocks noGrp="1" noRot="1" noChangeAspect="1"/>
+          </p:cNvSpPr>
+          <p:nvPr>
+            <p:ph type="sldImg"/>
+          </p:nvPr>
+        </p:nvSpPr>
+        <p:spPr/>
+      </p:sp>
+      <p:sp>
+        <p:nvSpPr>
+          <p:cNvPr id="3" name="Notizenplatzhalter 2"/>
+          <p:cNvSpPr>
+            <a:spLocks noGrp="1"/>
+          </p:cNvSpPr>
+          <p:nvPr>
+            <p:ph type="body" idx="1"/>
+          </p:nvPr>
+        </p:nvSpPr>
+        <p:spPr/>
+        <p:txBody>
+          <a:bodyPr/>
+          <a:lstStyle/>
+          <a:p>
+            <a:r>
+              <a:rPr lang="de-AT" dirty="0"/>
+              <a:t>Macht </a:t>
+            </a:r>
+            <a:r>
+              <a:rPr lang="de-AT" dirty="0" err="1"/>
+              <a:t>phillp</a:t>
+            </a:r>
+            <a:endParaRPr lang="de-AT" dirty="0"/>
+          </a:p>
+        </p:txBody>
+      </p:sp>
+      <p:sp>
+        <p:nvSpPr>
+          <p:cNvPr id="4" name="Foliennummernplatzhalter 3"/>
+          <p:cNvSpPr>
+            <a:spLocks noGrp="1"/>
+          </p:cNvSpPr>
+          <p:nvPr>
+            <p:ph type="sldNum" sz="quarter" idx="10"/>
+          </p:nvPr>
+        </p:nvSpPr>
+        <p:spPr/>
+        <p:txBody>
+          <a:bodyPr/>
+          <a:lstStyle/>
+          <a:p>
+            <a:fld id="{FFB944FA-82A2-4D87-AF4C-32D6F3284FD2}" type="slidenum">
+              <a:rPr lang="de-AT" smtClean="0"/>
+              <a:t>7</a:t>
             </a:fld>
             <a:endParaRPr lang="de-AT"/>
           </a:p>
@@ -5522,7 +6617,7 @@
           <a:p>
             <a:fld id="{81E4DA5A-B91E-4736-AA36-536C06A9A47C}" type="datetimeFigureOut">
               <a:rPr lang="de-AT" smtClean="0"/>
-              <a:t>20.01.2017</a:t>
+              <a:t>22.01.2017</a:t>
             </a:fld>
             <a:endParaRPr lang="de-AT"/>
           </a:p>
@@ -5692,7 +6787,7 @@
           <a:p>
             <a:fld id="{81E4DA5A-B91E-4736-AA36-536C06A9A47C}" type="datetimeFigureOut">
               <a:rPr lang="de-AT" smtClean="0"/>
-              <a:t>20.01.2017</a:t>
+              <a:t>22.01.2017</a:t>
             </a:fld>
             <a:endParaRPr lang="de-AT"/>
           </a:p>
@@ -5872,7 +6967,7 @@
           <a:p>
             <a:fld id="{81E4DA5A-B91E-4736-AA36-536C06A9A47C}" type="datetimeFigureOut">
               <a:rPr lang="de-AT" smtClean="0"/>
-              <a:t>20.01.2017</a:t>
+              <a:t>22.01.2017</a:t>
             </a:fld>
             <a:endParaRPr lang="de-AT"/>
           </a:p>
@@ -6042,7 +7137,7 @@
           <a:p>
             <a:fld id="{81E4DA5A-B91E-4736-AA36-536C06A9A47C}" type="datetimeFigureOut">
               <a:rPr lang="de-AT" smtClean="0"/>
-              <a:t>20.01.2017</a:t>
+              <a:t>22.01.2017</a:t>
             </a:fld>
             <a:endParaRPr lang="de-AT"/>
           </a:p>
@@ -6286,7 +7381,7 @@
           <a:p>
             <a:fld id="{81E4DA5A-B91E-4736-AA36-536C06A9A47C}" type="datetimeFigureOut">
               <a:rPr lang="de-AT" smtClean="0"/>
-              <a:t>20.01.2017</a:t>
+              <a:t>22.01.2017</a:t>
             </a:fld>
             <a:endParaRPr lang="de-AT"/>
           </a:p>
@@ -6518,7 +7613,7 @@
           <a:p>
             <a:fld id="{81E4DA5A-B91E-4736-AA36-536C06A9A47C}" type="datetimeFigureOut">
               <a:rPr lang="de-AT" smtClean="0"/>
-              <a:t>20.01.2017</a:t>
+              <a:t>22.01.2017</a:t>
             </a:fld>
             <a:endParaRPr lang="de-AT"/>
           </a:p>
@@ -6885,7 +7980,7 @@
           <a:p>
             <a:fld id="{81E4DA5A-B91E-4736-AA36-536C06A9A47C}" type="datetimeFigureOut">
               <a:rPr lang="de-AT" smtClean="0"/>
-              <a:t>20.01.2017</a:t>
+              <a:t>22.01.2017</a:t>
             </a:fld>
             <a:endParaRPr lang="de-AT"/>
           </a:p>
@@ -7003,7 +8098,7 @@
           <a:p>
             <a:fld id="{81E4DA5A-B91E-4736-AA36-536C06A9A47C}" type="datetimeFigureOut">
               <a:rPr lang="de-AT" smtClean="0"/>
-              <a:t>20.01.2017</a:t>
+              <a:t>22.01.2017</a:t>
             </a:fld>
             <a:endParaRPr lang="de-AT"/>
           </a:p>
@@ -7098,7 +8193,7 @@
           <a:p>
             <a:fld id="{81E4DA5A-B91E-4736-AA36-536C06A9A47C}" type="datetimeFigureOut">
               <a:rPr lang="de-AT" smtClean="0"/>
-              <a:t>20.01.2017</a:t>
+              <a:t>22.01.2017</a:t>
             </a:fld>
             <a:endParaRPr lang="de-AT"/>
           </a:p>
@@ -7375,7 +8470,7 @@
           <a:p>
             <a:fld id="{81E4DA5A-B91E-4736-AA36-536C06A9A47C}" type="datetimeFigureOut">
               <a:rPr lang="de-AT" smtClean="0"/>
-              <a:t>20.01.2017</a:t>
+              <a:t>22.01.2017</a:t>
             </a:fld>
             <a:endParaRPr lang="de-AT"/>
           </a:p>
@@ -7632,7 +8727,7 @@
           <a:p>
             <a:fld id="{81E4DA5A-B91E-4736-AA36-536C06A9A47C}" type="datetimeFigureOut">
               <a:rPr lang="de-AT" smtClean="0"/>
-              <a:t>20.01.2017</a:t>
+              <a:t>22.01.2017</a:t>
             </a:fld>
             <a:endParaRPr lang="de-AT"/>
           </a:p>
@@ -7697,9 +8792,16 @@
 <p:sldMaster xmlns:a="http://schemas.openxmlformats.org/drawingml/2006/main" xmlns:r="http://schemas.openxmlformats.org/officeDocument/2006/relationships" xmlns:p="http://schemas.openxmlformats.org/presentationml/2006/main">
   <p:cSld>
     <p:bg>
-      <p:bgRef idx="1001">
-        <a:schemeClr val="bg1"/>
-      </p:bgRef>
+      <p:bgPr>
+        <a:blipFill dpi="0" rotWithShape="1">
+          <a:blip r:embed="rId13">
+            <a:lum/>
+          </a:blip>
+          <a:srcRect/>
+          <a:tile tx="0" ty="0" sx="100000" sy="100000" flip="none" algn="tl"/>
+        </a:blipFill>
+        <a:effectLst/>
+      </p:bgPr>
     </p:bg>
     <p:spTree>
       <p:nvGrpSpPr>
@@ -7845,7 +8947,7 @@
           <a:p>
             <a:fld id="{81E4DA5A-B91E-4736-AA36-536C06A9A47C}" type="datetimeFigureOut">
               <a:rPr lang="de-AT" smtClean="0"/>
-              <a:t>20.01.2017</a:t>
+              <a:t>22.01.2017</a:t>
             </a:fld>
             <a:endParaRPr lang="de-AT"/>
           </a:p>
@@ -8388,7 +9490,7 @@
             </a:pPr>
             <a:r>
               <a:rPr lang="de-AT" sz="3600" b="1" dirty="0"/>
-              <a:t>The MMOTTG Site</a:t>
+              <a:t>The MMOTTTG Site</a:t>
             </a:r>
           </a:p>
           <a:p>
@@ -8421,6 +9523,18 @@
 <file path=ppt/slides/slide2.xml><?xml version="1.0" encoding="utf-8"?>
 <p:sld xmlns:a="http://schemas.openxmlformats.org/drawingml/2006/main" xmlns:r="http://schemas.openxmlformats.org/officeDocument/2006/relationships" xmlns:p="http://schemas.openxmlformats.org/presentationml/2006/main">
   <p:cSld>
+    <p:bg>
+      <p:bgPr>
+        <a:blipFill dpi="0" rotWithShape="1">
+          <a:blip r:embed="rId3">
+            <a:lum/>
+          </a:blip>
+          <a:srcRect/>
+          <a:tile tx="0" ty="0" sx="100000" sy="100000" flip="none" algn="tl"/>
+        </a:blipFill>
+        <a:effectLst/>
+      </p:bgPr>
+    </p:bg>
     <p:spTree>
       <p:nvGrpSpPr>
         <p:cNvPr id="1" name=""/>
@@ -8676,47 +9790,27 @@
           <a:lstStyle/>
           <a:p>
             <a:r>
-              <a:rPr lang="de-AT" dirty="0" err="1"/>
-              <a:t>Introduction</a:t>
-            </a:r>
-            <a:endParaRPr lang="de-AT" dirty="0"/>
-          </a:p>
-          <a:p>
-            <a:r>
-              <a:rPr lang="de-AT" dirty="0"/>
-              <a:t>Project </a:t>
-            </a:r>
-            <a:r>
-              <a:rPr lang="de-AT" dirty="0" err="1"/>
-              <a:t>review</a:t>
-            </a:r>
-            <a:endParaRPr lang="de-AT" dirty="0"/>
-          </a:p>
-          <a:p>
-            <a:r>
-              <a:rPr lang="de-AT" dirty="0" err="1"/>
-              <a:t>Learned</a:t>
-            </a:r>
-            <a:r>
-              <a:rPr lang="de-AT" dirty="0"/>
-              <a:t> </a:t>
-            </a:r>
-            <a:r>
-              <a:rPr lang="de-AT" dirty="0" err="1"/>
-              <a:t>lessons</a:t>
-            </a:r>
-            <a:endParaRPr lang="de-AT" dirty="0"/>
-          </a:p>
-          <a:p>
-            <a:r>
-              <a:rPr lang="de-AT" dirty="0"/>
-              <a:t>The </a:t>
-            </a:r>
-            <a:r>
-              <a:rPr lang="de-AT" dirty="0" err="1"/>
-              <a:t>result</a:t>
-            </a:r>
-            <a:endParaRPr lang="de-AT" dirty="0"/>
+              <a:rPr lang="en-US" dirty="0"/>
+              <a:t>introduction</a:t>
+            </a:r>
+          </a:p>
+          <a:p>
+            <a:r>
+              <a:rPr lang="en-US" dirty="0"/>
+              <a:t>project review</a:t>
+            </a:r>
+          </a:p>
+          <a:p>
+            <a:r>
+              <a:rPr lang="en-US" dirty="0"/>
+              <a:t>learned lessons</a:t>
+            </a:r>
+          </a:p>
+          <a:p>
+            <a:r>
+              <a:rPr lang="en-US" dirty="0"/>
+              <a:t>the result</a:t>
+            </a:r>
           </a:p>
           <a:p>
             <a:endParaRPr lang="de-AT" dirty="0"/>
@@ -8735,7 +9829,7 @@
           <p:nvPr/>
         </p:nvPicPr>
         <p:blipFill>
-          <a:blip r:embed="rId3">
+          <a:blip r:embed="rId4">
             <a:extLst>
               <a:ext uri="{28A0092B-C50C-407E-A947-70E740481C1C}">
                 <a14:useLocalDpi xmlns:a14="http://schemas.microsoft.com/office/drawing/2010/main"/>
@@ -8848,6 +9942,70 @@
           <a:chExt cx="0" cy="0"/>
         </a:xfrm>
       </p:grpSpPr>
+      <p:sp>
+        <p:nvSpPr>
+          <p:cNvPr id="16" name="Rechteck: abgerundete Ecken 15"/>
+          <p:cNvSpPr/>
+          <p:nvPr/>
+        </p:nvSpPr>
+        <p:spPr>
+          <a:xfrm>
+            <a:off x="166259" y="876695"/>
+            <a:ext cx="8829858" cy="4130180"/>
+          </a:xfrm>
+          <a:prstGeom prst="roundRect">
+            <a:avLst/>
+          </a:prstGeom>
+          <a:gradFill flip="none" rotWithShape="1">
+            <a:gsLst>
+              <a:gs pos="0">
+                <a:schemeClr val="bg1">
+                  <a:alpha val="0"/>
+                </a:schemeClr>
+              </a:gs>
+              <a:gs pos="100000">
+                <a:schemeClr val="bg1">
+                  <a:alpha val="80000"/>
+                </a:schemeClr>
+              </a:gs>
+            </a:gsLst>
+            <a:lin ang="10800000" scaled="1"/>
+            <a:tileRect/>
+          </a:gradFill>
+          <a:ln>
+            <a:noFill/>
+          </a:ln>
+        </p:spPr>
+        <p:style>
+          <a:lnRef idx="2">
+            <a:schemeClr val="accent1">
+              <a:shade val="50000"/>
+            </a:schemeClr>
+          </a:lnRef>
+          <a:fillRef idx="1">
+            <a:schemeClr val="accent1"/>
+          </a:fillRef>
+          <a:effectRef idx="0">
+            <a:schemeClr val="accent1"/>
+          </a:effectRef>
+          <a:fontRef idx="minor">
+            <a:schemeClr val="lt1"/>
+          </a:fontRef>
+        </p:style>
+        <p:txBody>
+          <a:bodyPr rot="0" spcFirstLastPara="0" vertOverflow="overflow" horzOverflow="overflow" vert="horz" wrap="square" lIns="91440" tIns="45720" rIns="91440" bIns="45720" numCol="1" spcCol="0" rtlCol="0" fromWordArt="0" anchor="ctr" anchorCtr="0" forceAA="0" compatLnSpc="1">
+            <a:prstTxWarp prst="textNoShape">
+              <a:avLst/>
+            </a:prstTxWarp>
+            <a:noAutofit/>
+          </a:bodyPr>
+          <a:lstStyle/>
+          <a:p>
+            <a:pPr algn="ctr"/>
+            <a:endParaRPr lang="de-AT"/>
+          </a:p>
+        </p:txBody>
+      </p:sp>
       <p:sp>
         <p:nvSpPr>
           <p:cNvPr id="14" name="Rechteck 13"/>
@@ -8996,10 +10154,9 @@
               </a:lnSpc>
             </a:pPr>
             <a:r>
-              <a:rPr lang="de-AT" sz="4000" dirty="0" err="1"/>
+              <a:rPr lang="en-US" sz="4000" dirty="0"/>
               <a:t>Introduction</a:t>
             </a:r>
-            <a:endParaRPr lang="de-AT" sz="4000" dirty="0"/>
           </a:p>
         </p:txBody>
       </p:sp>
@@ -9072,7 +10229,7 @@
           <p:nvPr>
             <p:extLst>
               <p:ext uri="{D42A27DB-BD31-4B8C-83A1-F6EECF244321}">
-                <p14:modId xmlns:p14="http://schemas.microsoft.com/office/powerpoint/2010/main" val="924698543"/>
+                <p14:modId xmlns:p14="http://schemas.microsoft.com/office/powerpoint/2010/main" val="1639379638"/>
               </p:ext>
             </p:extLst>
           </p:nvPr>
@@ -9140,64 +10297,33 @@
           <a:lstStyle/>
           <a:p>
             <a:r>
-              <a:rPr lang="de-AT" dirty="0"/>
+              <a:rPr lang="en-US" dirty="0"/>
               <a:t>Website</a:t>
             </a:r>
           </a:p>
           <a:p>
             <a:r>
-              <a:rPr lang="de-AT" dirty="0"/>
-              <a:t>Team </a:t>
-            </a:r>
-            <a:r>
-              <a:rPr lang="de-AT" dirty="0" err="1"/>
-              <a:t>based</a:t>
-            </a:r>
-            <a:r>
-              <a:rPr lang="de-AT" dirty="0"/>
-              <a:t> </a:t>
-            </a:r>
-            <a:r>
-              <a:rPr lang="de-AT" dirty="0" err="1"/>
-              <a:t>gaming</a:t>
-            </a:r>
-            <a:r>
-              <a:rPr lang="de-AT" dirty="0"/>
-              <a:t> </a:t>
-            </a:r>
-            <a:r>
-              <a:rPr lang="de-AT" dirty="0" err="1"/>
-              <a:t>experience</a:t>
-            </a:r>
-            <a:endParaRPr lang="de-AT" dirty="0"/>
+              <a:rPr lang="en-US" dirty="0"/>
+              <a:t>Team based gaming experience</a:t>
+            </a:r>
           </a:p>
           <a:p>
             <a:pPr lvl="1"/>
             <a:r>
-              <a:rPr lang="de-AT" sz="2500" dirty="0"/>
-              <a:t>4 in a </a:t>
-            </a:r>
-            <a:r>
-              <a:rPr lang="de-AT" sz="2500" dirty="0" err="1"/>
-              <a:t>row</a:t>
-            </a:r>
-            <a:endParaRPr lang="de-AT" sz="2500" dirty="0"/>
+              <a:rPr lang="en-US" sz="2500" dirty="0"/>
+              <a:t>4 in a row</a:t>
+            </a:r>
           </a:p>
           <a:p>
             <a:pPr lvl="1"/>
             <a:r>
-              <a:rPr lang="de-AT" sz="2500" dirty="0"/>
-              <a:t>tick-tack-</a:t>
-            </a:r>
-            <a:r>
-              <a:rPr lang="de-AT" sz="2500" dirty="0" err="1"/>
-              <a:t>toe</a:t>
-            </a:r>
-            <a:endParaRPr lang="de-AT" sz="2500" dirty="0"/>
-          </a:p>
-          <a:p>
-            <a:r>
-              <a:rPr lang="de-AT" dirty="0"/>
+              <a:rPr lang="en-US" sz="2500" dirty="0"/>
+              <a:t>tick-tack-toe</a:t>
+            </a:r>
+          </a:p>
+          <a:p>
+            <a:r>
+              <a:rPr lang="en-US" dirty="0"/>
               <a:t>Chat</a:t>
             </a:r>
           </a:p>
@@ -9212,7 +10338,7 @@
         <p:spPr>
           <a:xfrm>
             <a:off x="5462954" y="4958861"/>
-            <a:ext cx="2279727" cy="646331"/>
+            <a:ext cx="2282933" cy="646331"/>
           </a:xfrm>
           <a:prstGeom prst="rect">
             <a:avLst/>
@@ -9227,15 +10353,7 @@
           <a:p>
             <a:r>
               <a:rPr lang="de-AT" dirty="0"/>
-              <a:t>Hier </a:t>
-            </a:r>
-            <a:r>
-              <a:rPr lang="de-AT" dirty="0" err="1"/>
-              <a:t>bilder</a:t>
-            </a:r>
-            <a:r>
-              <a:rPr lang="de-AT" dirty="0"/>
-              <a:t> einfügen!!!</a:t>
+              <a:t>Hier Bilder einfügen!!!</a:t>
             </a:r>
           </a:p>
           <a:p>
@@ -9257,6 +10375,362 @@
 </file>
 
 <file path=ppt/slides/slide4.xml><?xml version="1.0" encoding="utf-8"?>
+<p:sld xmlns:a="http://schemas.openxmlformats.org/drawingml/2006/main" xmlns:r="http://schemas.openxmlformats.org/officeDocument/2006/relationships" xmlns:p="http://schemas.openxmlformats.org/presentationml/2006/main">
+  <p:cSld>
+    <p:spTree>
+      <p:nvGrpSpPr>
+        <p:cNvPr id="1" name=""/>
+        <p:cNvGrpSpPr/>
+        <p:nvPr/>
+      </p:nvGrpSpPr>
+      <p:grpSpPr>
+        <a:xfrm>
+          <a:off x="0" y="0"/>
+          <a:ext cx="0" cy="0"/>
+          <a:chOff x="0" y="0"/>
+          <a:chExt cx="0" cy="0"/>
+        </a:xfrm>
+      </p:grpSpPr>
+      <p:pic>
+        <p:nvPicPr>
+          <p:cNvPr id="5" name="Grafik 4"/>
+          <p:cNvPicPr>
+            <a:picLocks noChangeAspect="1"/>
+          </p:cNvPicPr>
+          <p:nvPr/>
+        </p:nvPicPr>
+        <p:blipFill>
+          <a:blip r:embed="rId3">
+            <a:clrChange>
+              <a:clrFrom>
+                <a:srgbClr val="FFFFFF"/>
+              </a:clrFrom>
+              <a:clrTo>
+                <a:srgbClr val="FFFFFF">
+                  <a:alpha val="0"/>
+                </a:srgbClr>
+              </a:clrTo>
+            </a:clrChange>
+          </a:blip>
+          <a:stretch>
+            <a:fillRect/>
+          </a:stretch>
+        </p:blipFill>
+        <p:spPr>
+          <a:xfrm>
+            <a:off x="682982" y="876694"/>
+            <a:ext cx="7408985" cy="5151455"/>
+          </a:xfrm>
+          <a:prstGeom prst="rect">
+            <a:avLst/>
+          </a:prstGeom>
+        </p:spPr>
+      </p:pic>
+      <p:sp>
+        <p:nvSpPr>
+          <p:cNvPr id="14" name="Rechteck 13"/>
+          <p:cNvSpPr/>
+          <p:nvPr/>
+        </p:nvSpPr>
+        <p:spPr>
+          <a:xfrm flipV="1">
+            <a:off x="-1718553" y="6061440"/>
+            <a:ext cx="12490315" cy="980389"/>
+          </a:xfrm>
+          <a:prstGeom prst="rect">
+            <a:avLst/>
+          </a:prstGeom>
+          <a:gradFill flip="none" rotWithShape="1">
+            <a:gsLst>
+              <a:gs pos="0">
+                <a:schemeClr val="accent1">
+                  <a:lumMod val="5000"/>
+                  <a:lumOff val="95000"/>
+                </a:schemeClr>
+              </a:gs>
+              <a:gs pos="100000">
+                <a:srgbClr val="0E78AD"/>
+              </a:gs>
+            </a:gsLst>
+            <a:lin ang="0" scaled="1"/>
+            <a:tileRect/>
+          </a:gradFill>
+          <a:ln w="50800">
+            <a:solidFill>
+              <a:srgbClr val="0E78AD"/>
+            </a:solidFill>
+          </a:ln>
+        </p:spPr>
+        <p:style>
+          <a:lnRef idx="2">
+            <a:schemeClr val="accent1">
+              <a:shade val="50000"/>
+            </a:schemeClr>
+          </a:lnRef>
+          <a:fillRef idx="1">
+            <a:schemeClr val="accent1"/>
+          </a:fillRef>
+          <a:effectRef idx="0">
+            <a:schemeClr val="accent1"/>
+          </a:effectRef>
+          <a:fontRef idx="minor">
+            <a:schemeClr val="lt1"/>
+          </a:fontRef>
+        </p:style>
+        <p:txBody>
+          <a:bodyPr rtlCol="0" anchor="ctr"/>
+          <a:lstStyle/>
+          <a:p>
+            <a:pPr algn="ctr"/>
+            <a:endParaRPr lang="de-AT" dirty="0"/>
+          </a:p>
+        </p:txBody>
+      </p:sp>
+      <p:sp>
+        <p:nvSpPr>
+          <p:cNvPr id="13" name="Rechteck 12"/>
+          <p:cNvSpPr/>
+          <p:nvPr/>
+        </p:nvSpPr>
+        <p:spPr>
+          <a:xfrm flipV="1">
+            <a:off x="-1718553" y="-84840"/>
+            <a:ext cx="12490315" cy="961534"/>
+          </a:xfrm>
+          <a:prstGeom prst="rect">
+            <a:avLst/>
+          </a:prstGeom>
+          <a:gradFill flip="none" rotWithShape="1">
+            <a:gsLst>
+              <a:gs pos="0">
+                <a:schemeClr val="accent1">
+                  <a:lumMod val="5000"/>
+                  <a:lumOff val="95000"/>
+                </a:schemeClr>
+              </a:gs>
+              <a:gs pos="100000">
+                <a:srgbClr val="0E78AD"/>
+              </a:gs>
+            </a:gsLst>
+            <a:lin ang="0" scaled="1"/>
+            <a:tileRect/>
+          </a:gradFill>
+          <a:ln w="50800">
+            <a:solidFill>
+              <a:srgbClr val="0E78AD"/>
+            </a:solidFill>
+          </a:ln>
+        </p:spPr>
+        <p:style>
+          <a:lnRef idx="2">
+            <a:schemeClr val="accent1">
+              <a:shade val="50000"/>
+            </a:schemeClr>
+          </a:lnRef>
+          <a:fillRef idx="1">
+            <a:schemeClr val="accent1"/>
+          </a:fillRef>
+          <a:effectRef idx="0">
+            <a:schemeClr val="accent1"/>
+          </a:effectRef>
+          <a:fontRef idx="minor">
+            <a:schemeClr val="lt1"/>
+          </a:fontRef>
+        </p:style>
+        <p:txBody>
+          <a:bodyPr rtlCol="0" anchor="ctr"/>
+          <a:lstStyle/>
+          <a:p>
+            <a:pPr algn="ctr"/>
+            <a:endParaRPr lang="de-AT"/>
+          </a:p>
+        </p:txBody>
+      </p:sp>
+      <p:sp>
+        <p:nvSpPr>
+          <p:cNvPr id="8" name="Titel 7"/>
+          <p:cNvSpPr>
+            <a:spLocks noGrp="1"/>
+          </p:cNvSpPr>
+          <p:nvPr>
+            <p:ph type="title"/>
+          </p:nvPr>
+        </p:nvSpPr>
+        <p:spPr>
+          <a:xfrm>
+            <a:off x="1093509" y="-85598"/>
+            <a:ext cx="7902608" cy="962293"/>
+          </a:xfrm>
+        </p:spPr>
+        <p:txBody>
+          <a:bodyPr>
+            <a:normAutofit/>
+          </a:bodyPr>
+          <a:lstStyle/>
+          <a:p>
+            <a:pPr>
+              <a:lnSpc>
+                <a:spcPct val="100000"/>
+              </a:lnSpc>
+            </a:pPr>
+            <a:r>
+              <a:rPr lang="de-AT" sz="4000" dirty="0"/>
+              <a:t>Project Review</a:t>
+            </a:r>
+          </a:p>
+        </p:txBody>
+      </p:sp>
+      <p:sp>
+        <p:nvSpPr>
+          <p:cNvPr id="10" name="Textfeld 9"/>
+          <p:cNvSpPr txBox="1"/>
+          <p:nvPr/>
+        </p:nvSpPr>
+        <p:spPr>
+          <a:xfrm>
+            <a:off x="-10180" y="6182296"/>
+            <a:ext cx="2365391" cy="369332"/>
+          </a:xfrm>
+          <a:prstGeom prst="rect">
+            <a:avLst/>
+          </a:prstGeom>
+          <a:noFill/>
+        </p:spPr>
+        <p:txBody>
+          <a:bodyPr wrap="none" rtlCol="0">
+            <a:spAutoFit/>
+          </a:bodyPr>
+          <a:lstStyle/>
+          <a:p>
+            <a:r>
+              <a:rPr lang="de-AT" dirty="0"/>
+              <a:t>www.multiplay.website</a:t>
+            </a:r>
+          </a:p>
+        </p:txBody>
+      </p:sp>
+      <p:sp>
+        <p:nvSpPr>
+          <p:cNvPr id="11" name="Textfeld 10"/>
+          <p:cNvSpPr txBox="1"/>
+          <p:nvPr/>
+        </p:nvSpPr>
+        <p:spPr>
+          <a:xfrm>
+            <a:off x="8505923" y="6182296"/>
+            <a:ext cx="301686" cy="369332"/>
+          </a:xfrm>
+          <a:prstGeom prst="rect">
+            <a:avLst/>
+          </a:prstGeom>
+          <a:noFill/>
+        </p:spPr>
+        <p:txBody>
+          <a:bodyPr wrap="none" rtlCol="0">
+            <a:spAutoFit/>
+          </a:bodyPr>
+          <a:lstStyle/>
+          <a:p>
+            <a:r>
+              <a:rPr lang="de-AT" dirty="0">
+                <a:solidFill>
+                  <a:schemeClr val="bg1"/>
+                </a:solidFill>
+              </a:rPr>
+              <a:t>3</a:t>
+            </a:r>
+          </a:p>
+        </p:txBody>
+      </p:sp>
+      <p:pic>
+        <p:nvPicPr>
+          <p:cNvPr id="15" name="Grafik 14"/>
+          <p:cNvPicPr>
+            <a:picLocks noChangeAspect="1"/>
+          </p:cNvPicPr>
+          <p:nvPr/>
+        </p:nvPicPr>
+        <p:blipFill>
+          <a:blip r:embed="rId4">
+            <a:extLst>
+              <a:ext uri="{28A0092B-C50C-407E-A947-70E740481C1C}">
+                <a14:useLocalDpi xmlns:a14="http://schemas.microsoft.com/office/drawing/2010/main"/>
+              </a:ext>
+            </a:extLst>
+          </a:blip>
+          <a:stretch>
+            <a:fillRect/>
+          </a:stretch>
+        </p:blipFill>
+        <p:spPr>
+          <a:xfrm>
+            <a:off x="-1" y="-9426"/>
+            <a:ext cx="864000" cy="864000"/>
+          </a:xfrm>
+          <a:prstGeom prst="rect">
+            <a:avLst/>
+          </a:prstGeom>
+        </p:spPr>
+      </p:pic>
+      <p:sp>
+        <p:nvSpPr>
+          <p:cNvPr id="18" name="Textfeld 17"/>
+          <p:cNvSpPr txBox="1"/>
+          <p:nvPr/>
+        </p:nvSpPr>
+        <p:spPr>
+          <a:xfrm>
+            <a:off x="431999" y="1816108"/>
+            <a:ext cx="8375610" cy="3631763"/>
+          </a:xfrm>
+          <a:prstGeom prst="rect">
+            <a:avLst/>
+          </a:prstGeom>
+          <a:noFill/>
+        </p:spPr>
+        <p:txBody>
+          <a:bodyPr wrap="square" rtlCol="0">
+            <a:spAutoFit/>
+          </a:bodyPr>
+          <a:lstStyle/>
+          <a:p>
+            <a:r>
+              <a:rPr lang="de-AT" sz="11500" dirty="0"/>
+              <a:t>SIMPLYFY !!!!</a:t>
+            </a:r>
+            <a:br>
+              <a:rPr lang="de-AT" sz="11500" dirty="0"/>
+            </a:br>
+            <a:r>
+              <a:rPr lang="de-AT" sz="11500" dirty="0" err="1"/>
+              <a:t>And</a:t>
+            </a:r>
+            <a:r>
+              <a:rPr lang="de-AT" sz="11500" dirty="0"/>
+              <a:t> </a:t>
+            </a:r>
+            <a:r>
+              <a:rPr lang="de-AT" sz="11500" dirty="0" err="1"/>
+              <a:t>animate</a:t>
+            </a:r>
+            <a:endParaRPr lang="de-AT" sz="11500" dirty="0"/>
+          </a:p>
+        </p:txBody>
+      </p:sp>
+    </p:spTree>
+    <p:extLst>
+      <p:ext uri="{BB962C8B-B14F-4D97-AF65-F5344CB8AC3E}">
+        <p14:creationId xmlns:p14="http://schemas.microsoft.com/office/powerpoint/2010/main" val="1253012379"/>
+      </p:ext>
+    </p:extLst>
+  </p:cSld>
+  <p:clrMapOvr>
+    <a:masterClrMapping/>
+  </p:clrMapOvr>
+</p:sld>
+</file>
+
+<file path=ppt/slides/slide5.xml><?xml version="1.0" encoding="utf-8"?>
 <p:sld xmlns:a="http://schemas.openxmlformats.org/drawingml/2006/main" xmlns:r="http://schemas.openxmlformats.org/officeDocument/2006/relationships" xmlns:p="http://schemas.openxmlformats.org/presentationml/2006/main">
   <p:cSld>
     <p:spTree>
@@ -9486,13 +10960,8 @@
             </a:pPr>
             <a:r>
               <a:rPr lang="de-AT" sz="4000" dirty="0"/>
-              <a:t>Project </a:t>
-            </a:r>
-            <a:r>
-              <a:rPr lang="de-AT" sz="4000" dirty="0" err="1"/>
-              <a:t>review</a:t>
-            </a:r>
-            <a:endParaRPr lang="de-AT" sz="4000" dirty="0"/>
+              <a:t>Project Review</a:t>
+            </a:r>
           </a:p>
         </p:txBody>
       </p:sp>
@@ -9518,6 +10987,12 @@
           </a:bodyPr>
           <a:lstStyle/>
           <a:p>
+            <a:pPr marL="0" indent="0">
+              <a:buNone/>
+            </a:pPr>
+            <a:endParaRPr lang="de-AT" dirty="0"/>
+          </a:p>
+          <a:p>
             <a:r>
               <a:rPr lang="de-AT" dirty="0"/>
               <a:t>Hier kommt das ganze PM </a:t>
@@ -9542,15 +11017,6 @@
               <a:rPr lang="de-AT" dirty="0"/>
               <a:t>Schätzung der PMs und vergleich mit tatsächlichem Wert</a:t>
             </a:r>
-          </a:p>
-          <a:p>
-            <a:r>
-              <a:rPr lang="de-AT" dirty="0"/>
-              <a:t>Was wir benutzt haben für Technologien</a:t>
-            </a:r>
-          </a:p>
-          <a:p>
-            <a:endParaRPr lang="de-AT" dirty="0"/>
           </a:p>
         </p:txBody>
       </p:sp>
@@ -9646,10 +11112,34 @@
           </a:prstGeom>
         </p:spPr>
       </p:pic>
+      <p:pic>
+        <p:nvPicPr>
+          <p:cNvPr id="2" name="Grafik 1"/>
+          <p:cNvPicPr>
+            <a:picLocks noChangeAspect="1"/>
+          </p:cNvPicPr>
+          <p:nvPr/>
+        </p:nvPicPr>
+        <p:blipFill>
+          <a:blip r:embed="rId4"/>
+          <a:stretch>
+            <a:fillRect/>
+          </a:stretch>
+        </p:blipFill>
+        <p:spPr>
+          <a:xfrm>
+            <a:off x="-45396" y="4111968"/>
+            <a:ext cx="9144000" cy="1703294"/>
+          </a:xfrm>
+          <a:prstGeom prst="rect">
+            <a:avLst/>
+          </a:prstGeom>
+        </p:spPr>
+      </p:pic>
     </p:spTree>
     <p:extLst>
       <p:ext uri="{BB962C8B-B14F-4D97-AF65-F5344CB8AC3E}">
-        <p14:creationId xmlns:p14="http://schemas.microsoft.com/office/powerpoint/2010/main" val="1253012379"/>
+        <p14:creationId xmlns:p14="http://schemas.microsoft.com/office/powerpoint/2010/main" val="234440923"/>
       </p:ext>
     </p:extLst>
   </p:cSld>
@@ -9659,7 +11149,7 @@
 </p:sld>
 </file>
 
-<file path=ppt/slides/slide5.xml><?xml version="1.0" encoding="utf-8"?>
+<file path=ppt/slides/slide6.xml><?xml version="1.0" encoding="utf-8"?>
 <p:sld xmlns:a="http://schemas.openxmlformats.org/drawingml/2006/main" xmlns:r="http://schemas.openxmlformats.org/officeDocument/2006/relationships" xmlns:p="http://schemas.openxmlformats.org/presentationml/2006/main">
   <p:cSld>
     <p:spTree>
@@ -9824,18 +11314,9 @@
               </a:lnSpc>
             </a:pPr>
             <a:r>
-              <a:rPr lang="de-AT" sz="4000" dirty="0" err="1"/>
-              <a:t>Learned</a:t>
-            </a:r>
-            <a:r>
-              <a:rPr lang="de-AT" sz="4000" dirty="0"/>
-              <a:t> </a:t>
-            </a:r>
-            <a:r>
-              <a:rPr lang="de-AT" sz="4000" dirty="0" err="1"/>
-              <a:t>lessons</a:t>
-            </a:r>
-            <a:endParaRPr lang="de-AT" sz="4000" dirty="0"/>
+              <a:rPr lang="en-US" sz="4000" dirty="0"/>
+              <a:t>Learned Lessons</a:t>
+            </a:r>
           </a:p>
         </p:txBody>
       </p:sp>
@@ -10127,7 +11608,7 @@
 </p:sld>
 </file>
 
-<file path=ppt/slides/slide6.xml><?xml version="1.0" encoding="utf-8"?>
+<file path=ppt/slides/slide7.xml><?xml version="1.0" encoding="utf-8"?>
 <p:sld xmlns:a="http://schemas.openxmlformats.org/drawingml/2006/main" xmlns:r="http://schemas.openxmlformats.org/officeDocument/2006/relationships" xmlns:p="http://schemas.openxmlformats.org/presentationml/2006/main">
   <p:cSld>
     <p:spTree>

</xml_diff>